<commit_message>
complete ppt in 9/29/2017
</commit_message>
<xml_diff>
--- a/blockchain_intrduce.pptx
+++ b/blockchain_intrduce.pptx
@@ -8,27 +8,27 @@
     <p:sldId id="256" r:id="rId2"/>
     <p:sldId id="257" r:id="rId3"/>
     <p:sldId id="258" r:id="rId4"/>
-    <p:sldId id="259" r:id="rId5"/>
-    <p:sldId id="260" r:id="rId6"/>
-    <p:sldId id="272" r:id="rId7"/>
-    <p:sldId id="261" r:id="rId8"/>
-    <p:sldId id="262" r:id="rId9"/>
-    <p:sldId id="280" r:id="rId10"/>
-    <p:sldId id="277" r:id="rId11"/>
-    <p:sldId id="278" r:id="rId12"/>
-    <p:sldId id="279" r:id="rId13"/>
+    <p:sldId id="272" r:id="rId5"/>
+    <p:sldId id="285" r:id="rId6"/>
+    <p:sldId id="261" r:id="rId7"/>
+    <p:sldId id="280" r:id="rId8"/>
+    <p:sldId id="277" r:id="rId9"/>
+    <p:sldId id="278" r:id="rId10"/>
+    <p:sldId id="279" r:id="rId11"/>
+    <p:sldId id="286" r:id="rId12"/>
+    <p:sldId id="264" r:id="rId13"/>
     <p:sldId id="283" r:id="rId14"/>
-    <p:sldId id="264" r:id="rId15"/>
-    <p:sldId id="265" r:id="rId16"/>
-    <p:sldId id="266" r:id="rId17"/>
-    <p:sldId id="282" r:id="rId18"/>
-    <p:sldId id="268" r:id="rId19"/>
-    <p:sldId id="269" r:id="rId20"/>
-    <p:sldId id="267" r:id="rId21"/>
-    <p:sldId id="273" r:id="rId22"/>
-    <p:sldId id="270" r:id="rId23"/>
-    <p:sldId id="281" r:id="rId24"/>
-    <p:sldId id="271" r:id="rId25"/>
+    <p:sldId id="265" r:id="rId15"/>
+    <p:sldId id="266" r:id="rId16"/>
+    <p:sldId id="282" r:id="rId17"/>
+    <p:sldId id="267" r:id="rId18"/>
+    <p:sldId id="289" r:id="rId19"/>
+    <p:sldId id="273" r:id="rId20"/>
+    <p:sldId id="271" r:id="rId21"/>
+    <p:sldId id="290" r:id="rId22"/>
+    <p:sldId id="293" r:id="rId23"/>
+    <p:sldId id="291" r:id="rId24"/>
+    <p:sldId id="287" r:id="rId25"/>
   </p:sldIdLst>
   <p:sldSz cx="12192000" cy="6858000"/>
   <p:notesSz cx="6858000" cy="9144000"/>
@@ -135,27 +135,27 @@
             <p14:sldId id="256"/>
             <p14:sldId id="257"/>
             <p14:sldId id="258"/>
-            <p14:sldId id="259"/>
-            <p14:sldId id="260"/>
             <p14:sldId id="272"/>
+            <p14:sldId id="285"/>
             <p14:sldId id="261"/>
-            <p14:sldId id="262"/>
             <p14:sldId id="280"/>
             <p14:sldId id="277"/>
             <p14:sldId id="278"/>
             <p14:sldId id="279"/>
+            <p14:sldId id="286"/>
+            <p14:sldId id="264"/>
             <p14:sldId id="283"/>
-            <p14:sldId id="264"/>
             <p14:sldId id="265"/>
             <p14:sldId id="266"/>
             <p14:sldId id="282"/>
-            <p14:sldId id="268"/>
-            <p14:sldId id="269"/>
             <p14:sldId id="267"/>
+            <p14:sldId id="289"/>
             <p14:sldId id="273"/>
-            <p14:sldId id="270"/>
-            <p14:sldId id="281"/>
             <p14:sldId id="271"/>
+            <p14:sldId id="290"/>
+            <p14:sldId id="293"/>
+            <p14:sldId id="291"/>
+            <p14:sldId id="287"/>
           </p14:sldIdLst>
         </p14:section>
       </p14:sectionLst>
@@ -318,7 +318,7 @@
           <a:p>
             <a:fld id="{A64F318E-3341-4C17-BA94-4B2931C71616}" type="datetimeFigureOut">
               <a:rPr lang="zh-CN" altLang="en-US" smtClean="0"/>
-              <a:t>2017/9/24</a:t>
+              <a:t>2017/9/26</a:t>
             </a:fld>
             <a:endParaRPr lang="zh-CN" altLang="en-US"/>
           </a:p>
@@ -516,7 +516,7 @@
           <a:p>
             <a:fld id="{A64F318E-3341-4C17-BA94-4B2931C71616}" type="datetimeFigureOut">
               <a:rPr lang="zh-CN" altLang="en-US" smtClean="0"/>
-              <a:t>2017/9/24</a:t>
+              <a:t>2017/9/26</a:t>
             </a:fld>
             <a:endParaRPr lang="zh-CN" altLang="en-US"/>
           </a:p>
@@ -724,7 +724,7 @@
           <a:p>
             <a:fld id="{A64F318E-3341-4C17-BA94-4B2931C71616}" type="datetimeFigureOut">
               <a:rPr lang="zh-CN" altLang="en-US" smtClean="0"/>
-              <a:t>2017/9/24</a:t>
+              <a:t>2017/9/26</a:t>
             </a:fld>
             <a:endParaRPr lang="zh-CN" altLang="en-US"/>
           </a:p>
@@ -922,7 +922,7 @@
           <a:p>
             <a:fld id="{A64F318E-3341-4C17-BA94-4B2931C71616}" type="datetimeFigureOut">
               <a:rPr lang="zh-CN" altLang="en-US" smtClean="0"/>
-              <a:t>2017/9/24</a:t>
+              <a:t>2017/9/26</a:t>
             </a:fld>
             <a:endParaRPr lang="zh-CN" altLang="en-US"/>
           </a:p>
@@ -1197,7 +1197,7 @@
           <a:p>
             <a:fld id="{A64F318E-3341-4C17-BA94-4B2931C71616}" type="datetimeFigureOut">
               <a:rPr lang="zh-CN" altLang="en-US" smtClean="0"/>
-              <a:t>2017/9/24</a:t>
+              <a:t>2017/9/26</a:t>
             </a:fld>
             <a:endParaRPr lang="zh-CN" altLang="en-US"/>
           </a:p>
@@ -1462,7 +1462,7 @@
           <a:p>
             <a:fld id="{A64F318E-3341-4C17-BA94-4B2931C71616}" type="datetimeFigureOut">
               <a:rPr lang="zh-CN" altLang="en-US" smtClean="0"/>
-              <a:t>2017/9/24</a:t>
+              <a:t>2017/9/26</a:t>
             </a:fld>
             <a:endParaRPr lang="zh-CN" altLang="en-US"/>
           </a:p>
@@ -1874,7 +1874,7 @@
           <a:p>
             <a:fld id="{A64F318E-3341-4C17-BA94-4B2931C71616}" type="datetimeFigureOut">
               <a:rPr lang="zh-CN" altLang="en-US" smtClean="0"/>
-              <a:t>2017/9/24</a:t>
+              <a:t>2017/9/26</a:t>
             </a:fld>
             <a:endParaRPr lang="zh-CN" altLang="en-US"/>
           </a:p>
@@ -2015,7 +2015,7 @@
           <a:p>
             <a:fld id="{A64F318E-3341-4C17-BA94-4B2931C71616}" type="datetimeFigureOut">
               <a:rPr lang="zh-CN" altLang="en-US" smtClean="0"/>
-              <a:t>2017/9/24</a:t>
+              <a:t>2017/9/26</a:t>
             </a:fld>
             <a:endParaRPr lang="zh-CN" altLang="en-US"/>
           </a:p>
@@ -2128,7 +2128,7 @@
           <a:p>
             <a:fld id="{A64F318E-3341-4C17-BA94-4B2931C71616}" type="datetimeFigureOut">
               <a:rPr lang="zh-CN" altLang="en-US" smtClean="0"/>
-              <a:t>2017/9/24</a:t>
+              <a:t>2017/9/26</a:t>
             </a:fld>
             <a:endParaRPr lang="zh-CN" altLang="en-US"/>
           </a:p>
@@ -2439,7 +2439,7 @@
           <a:p>
             <a:fld id="{A64F318E-3341-4C17-BA94-4B2931C71616}" type="datetimeFigureOut">
               <a:rPr lang="zh-CN" altLang="en-US" smtClean="0"/>
-              <a:t>2017/9/24</a:t>
+              <a:t>2017/9/26</a:t>
             </a:fld>
             <a:endParaRPr lang="zh-CN" altLang="en-US"/>
           </a:p>
@@ -2727,7 +2727,7 @@
           <a:p>
             <a:fld id="{A64F318E-3341-4C17-BA94-4B2931C71616}" type="datetimeFigureOut">
               <a:rPr lang="zh-CN" altLang="en-US" smtClean="0"/>
-              <a:t>2017/9/24</a:t>
+              <a:t>2017/9/26</a:t>
             </a:fld>
             <a:endParaRPr lang="zh-CN" altLang="en-US"/>
           </a:p>
@@ -2968,7 +2968,7 @@
           <a:p>
             <a:fld id="{A64F318E-3341-4C17-BA94-4B2931C71616}" type="datetimeFigureOut">
               <a:rPr lang="zh-CN" altLang="en-US" smtClean="0"/>
-              <a:t>2017/9/24</a:t>
+              <a:t>2017/9/26</a:t>
             </a:fld>
             <a:endParaRPr lang="zh-CN" altLang="en-US"/>
           </a:p>
@@ -3429,12 +3429,30 @@
             <p:ph type="subTitle" idx="1"/>
           </p:nvPr>
         </p:nvSpPr>
-        <p:spPr/>
+        <p:spPr>
+          <a:xfrm>
+            <a:off x="2571565" y="4356640"/>
+            <a:ext cx="9144000" cy="1999772"/>
+          </a:xfrm>
+        </p:spPr>
         <p:txBody>
           <a:bodyPr/>
           <a:lstStyle/>
           <a:p>
-            <a:endParaRPr lang="zh-CN" altLang="en-US" dirty="0"/>
+            <a:endParaRPr lang="en-US" altLang="zh-CN" dirty="0"/>
+          </a:p>
+          <a:p>
+            <a:endParaRPr lang="en-US" altLang="zh-CN" dirty="0"/>
+          </a:p>
+          <a:p>
+            <a:r>
+              <a:rPr lang="en-US" altLang="zh-CN" dirty="0"/>
+              <a:t>							</a:t>
+            </a:r>
+            <a:r>
+              <a:rPr lang="zh-CN" altLang="en-US" dirty="0"/>
+              <a:t>王柏钢</a:t>
+            </a:r>
           </a:p>
         </p:txBody>
       </p:sp>
@@ -3473,248 +3491,6 @@
           <p:cNvPr id="3" name="内容占位符 2">
             <a:extLst>
               <a:ext uri="{FF2B5EF4-FFF2-40B4-BE49-F238E27FC236}">
-                <a16:creationId xmlns:a16="http://schemas.microsoft.com/office/drawing/2014/main" id="{59A83941-ADA5-4FAA-B5BB-EBE87358434E}"/>
-              </a:ext>
-            </a:extLst>
-          </p:cNvPr>
-          <p:cNvSpPr>
-            <a:spLocks noGrp="1"/>
-          </p:cNvSpPr>
-          <p:nvPr>
-            <p:ph idx="1"/>
-          </p:nvPr>
-        </p:nvSpPr>
-        <p:spPr>
-          <a:xfrm>
-            <a:off x="1042386" y="1133166"/>
-            <a:ext cx="10515600" cy="4351338"/>
-          </a:xfrm>
-        </p:spPr>
-        <p:txBody>
-          <a:bodyPr>
-            <a:normAutofit/>
-          </a:bodyPr>
-          <a:lstStyle/>
-          <a:p>
-            <a:r>
-              <a:rPr lang="zh-CN" altLang="en-US" dirty="0"/>
-              <a:t>私钥：</a:t>
-            </a:r>
-            <a:r>
-              <a:rPr lang="en-US" altLang="zh-CN" dirty="0"/>
-              <a:t>	</a:t>
-            </a:r>
-            <a:r>
-              <a:rPr lang="zh-CN" altLang="en-US" dirty="0"/>
-              <a:t>由系统随机生成一个私钥，范围为</a:t>
-            </a:r>
-            <a:r>
-              <a:rPr lang="en-US" altLang="zh-CN" dirty="0"/>
-              <a:t>1. 0e+77</a:t>
-            </a:r>
-            <a:r>
-              <a:rPr lang="zh-CN" altLang="en-US" dirty="0"/>
-              <a:t>，保证不会</a:t>
-            </a:r>
-            <a:r>
-              <a:rPr lang="en-US" altLang="zh-CN" dirty="0"/>
-              <a:t>		</a:t>
-            </a:r>
-            <a:r>
-              <a:rPr lang="zh-CN" altLang="en-US" dirty="0"/>
-              <a:t>重复</a:t>
-            </a:r>
-            <a:r>
-              <a:rPr lang="en-US" altLang="zh-CN" dirty="0"/>
-              <a:t>	</a:t>
-            </a:r>
-          </a:p>
-          <a:p>
-            <a:pPr marL="0" indent="0">
-              <a:buNone/>
-            </a:pPr>
-            <a:r>
-              <a:rPr lang="en-US" altLang="zh-CN" sz="1100" dirty="0"/>
-              <a:t>		1E99423A4ED27608A15A2616A2B0E9E52CED330AC530EDCC32C8FFC6A526AEDD</a:t>
-            </a:r>
-            <a:endParaRPr lang="en-US" altLang="zh-CN" dirty="0"/>
-          </a:p>
-          <a:p>
-            <a:endParaRPr lang="en-US" altLang="zh-CN" dirty="0"/>
-          </a:p>
-          <a:p>
-            <a:r>
-              <a:rPr lang="zh-CN" altLang="en-US" dirty="0"/>
-              <a:t>公钥：</a:t>
-            </a:r>
-            <a:endParaRPr lang="en-US" altLang="zh-CN" dirty="0"/>
-          </a:p>
-          <a:p>
-            <a:pPr marL="0" indent="0">
-              <a:buNone/>
-            </a:pPr>
-            <a:r>
-              <a:rPr lang="en-US" altLang="zh-CN" dirty="0"/>
-              <a:t>			K </a:t>
-            </a:r>
-            <a:r>
-              <a:rPr lang="zh-CN" altLang="en-US" dirty="0"/>
-              <a:t>（公钥）</a:t>
-            </a:r>
-            <a:r>
-              <a:rPr lang="en-US" altLang="zh-CN" dirty="0"/>
-              <a:t>= k</a:t>
-            </a:r>
-            <a:r>
-              <a:rPr lang="zh-CN" altLang="en-US" dirty="0"/>
-              <a:t>（私钥）</a:t>
-            </a:r>
-            <a:r>
-              <a:rPr lang="en-US" altLang="zh-CN" dirty="0"/>
-              <a:t> * G</a:t>
-            </a:r>
-            <a:r>
-              <a:rPr lang="zh-CN" altLang="en-US" dirty="0"/>
-              <a:t>（加密）</a:t>
-            </a:r>
-            <a:endParaRPr lang="en-US" altLang="zh-CN" dirty="0"/>
-          </a:p>
-          <a:p>
-            <a:pPr marL="0" indent="0">
-              <a:buNone/>
-            </a:pPr>
-            <a:endParaRPr lang="en-US" altLang="zh-CN" dirty="0"/>
-          </a:p>
-          <a:p>
-            <a:r>
-              <a:rPr lang="zh-CN" altLang="en-US" dirty="0"/>
-              <a:t>加密算法：</a:t>
-            </a:r>
-            <a:r>
-              <a:rPr lang="en-US" altLang="zh-CN" dirty="0"/>
-              <a:t>	</a:t>
-            </a:r>
-            <a:r>
-              <a:rPr lang="zh-CN" altLang="en-US" dirty="0"/>
-              <a:t>椭圆曲线加密</a:t>
-            </a:r>
-            <a:r>
-              <a:rPr lang="en-US" altLang="zh-CN" dirty="0"/>
-              <a:t>secp256k1</a:t>
-            </a:r>
-          </a:p>
-          <a:p>
-            <a:pPr marL="914400" lvl="2" indent="0">
-              <a:buNone/>
-            </a:pPr>
-            <a:r>
-              <a:rPr lang="en-US" altLang="zh-CN" dirty="0"/>
-              <a:t>	</a:t>
-            </a:r>
-          </a:p>
-          <a:p>
-            <a:endParaRPr lang="en-US" altLang="zh-CN" dirty="0"/>
-          </a:p>
-          <a:p>
-            <a:endParaRPr lang="zh-CN" altLang="en-US" dirty="0"/>
-          </a:p>
-        </p:txBody>
-      </p:sp>
-    </p:spTree>
-    <p:extLst>
-      <p:ext uri="{BB962C8B-B14F-4D97-AF65-F5344CB8AC3E}">
-        <p14:creationId xmlns:p14="http://schemas.microsoft.com/office/powerpoint/2010/main" val="438031169"/>
-      </p:ext>
-    </p:extLst>
-  </p:cSld>
-  <p:clrMapOvr>
-    <a:masterClrMapping/>
-  </p:clrMapOvr>
-</p:sld>
-</file>
-
-<file path=ppt/slides/slide11.xml><?xml version="1.0" encoding="utf-8"?>
-<p:sld xmlns:a="http://schemas.openxmlformats.org/drawingml/2006/main" xmlns:r="http://schemas.openxmlformats.org/officeDocument/2006/relationships" xmlns:p="http://schemas.openxmlformats.org/presentationml/2006/main">
-  <p:cSld>
-    <p:spTree>
-      <p:nvGrpSpPr>
-        <p:cNvPr id="1" name=""/>
-        <p:cNvGrpSpPr/>
-        <p:nvPr/>
-      </p:nvGrpSpPr>
-      <p:grpSpPr>
-        <a:xfrm>
-          <a:off x="0" y="0"/>
-          <a:ext cx="0" cy="0"/>
-          <a:chOff x="0" y="0"/>
-          <a:chExt cx="0" cy="0"/>
-        </a:xfrm>
-      </p:grpSpPr>
-      <p:pic>
-        <p:nvPicPr>
-          <p:cNvPr id="4" name="图片 3">
-            <a:extLst>
-              <a:ext uri="{FF2B5EF4-FFF2-40B4-BE49-F238E27FC236}">
-                <a16:creationId xmlns:a16="http://schemas.microsoft.com/office/drawing/2014/main" id="{FF7101A6-9396-4361-B9D6-8979583AAF10}"/>
-              </a:ext>
-            </a:extLst>
-          </p:cNvPr>
-          <p:cNvPicPr>
-            <a:picLocks noChangeAspect="1"/>
-          </p:cNvPicPr>
-          <p:nvPr/>
-        </p:nvPicPr>
-        <p:blipFill>
-          <a:blip r:embed="rId2"/>
-          <a:stretch>
-            <a:fillRect/>
-          </a:stretch>
-        </p:blipFill>
-        <p:spPr>
-          <a:xfrm>
-            <a:off x="2282291" y="0"/>
-            <a:ext cx="6491075" cy="6858000"/>
-          </a:xfrm>
-          <a:prstGeom prst="rect">
-            <a:avLst/>
-          </a:prstGeom>
-        </p:spPr>
-      </p:pic>
-    </p:spTree>
-    <p:extLst>
-      <p:ext uri="{BB962C8B-B14F-4D97-AF65-F5344CB8AC3E}">
-        <p14:creationId xmlns:p14="http://schemas.microsoft.com/office/powerpoint/2010/main" val="3352238733"/>
-      </p:ext>
-    </p:extLst>
-  </p:cSld>
-  <p:clrMapOvr>
-    <a:masterClrMapping/>
-  </p:clrMapOvr>
-</p:sld>
-</file>
-
-<file path=ppt/slides/slide12.xml><?xml version="1.0" encoding="utf-8"?>
-<p:sld xmlns:a="http://schemas.openxmlformats.org/drawingml/2006/main" xmlns:r="http://schemas.openxmlformats.org/officeDocument/2006/relationships" xmlns:p="http://schemas.openxmlformats.org/presentationml/2006/main">
-  <p:cSld>
-    <p:spTree>
-      <p:nvGrpSpPr>
-        <p:cNvPr id="1" name=""/>
-        <p:cNvGrpSpPr/>
-        <p:nvPr/>
-      </p:nvGrpSpPr>
-      <p:grpSpPr>
-        <a:xfrm>
-          <a:off x="0" y="0"/>
-          <a:ext cx="0" cy="0"/>
-          <a:chOff x="0" y="0"/>
-          <a:chExt cx="0" cy="0"/>
-        </a:xfrm>
-      </p:grpSpPr>
-      <p:sp>
-        <p:nvSpPr>
-          <p:cNvPr id="3" name="内容占位符 2">
-            <a:extLst>
-              <a:ext uri="{FF2B5EF4-FFF2-40B4-BE49-F238E27FC236}">
                 <a16:creationId xmlns:a16="http://schemas.microsoft.com/office/drawing/2014/main" id="{306E41F2-3726-4D49-8E46-1FD37727ACDA}"/>
               </a:ext>
             </a:extLst>
@@ -3807,7 +3583,7 @@
 </p:sld>
 </file>
 
-<file path=ppt/slides/slide13.xml><?xml version="1.0" encoding="utf-8"?>
+<file path=ppt/slides/slide11.xml><?xml version="1.0" encoding="utf-8"?>
 <p:sld xmlns:a="http://schemas.openxmlformats.org/drawingml/2006/main" xmlns:r="http://schemas.openxmlformats.org/officeDocument/2006/relationships" xmlns:p="http://schemas.openxmlformats.org/presentationml/2006/main">
   <p:cSld>
     <p:spTree>
@@ -3829,7 +3605,7 @@
           <p:cNvPr id="2" name="标题 1">
             <a:extLst>
               <a:ext uri="{FF2B5EF4-FFF2-40B4-BE49-F238E27FC236}">
-                <a16:creationId xmlns:a16="http://schemas.microsoft.com/office/drawing/2014/main" id="{56F01BA9-4B71-493E-B6B7-3425CA720E05}"/>
+                <a16:creationId xmlns:a16="http://schemas.microsoft.com/office/drawing/2014/main" id="{979242D3-7AD0-460D-9945-DC5D3B47375F}"/>
               </a:ext>
             </a:extLst>
           </p:cNvPr>
@@ -3847,13 +3623,8 @@
           <a:p>
             <a:r>
               <a:rPr lang="zh-CN" altLang="en-US" dirty="0"/>
-              <a:t>争夺记账权，得到</a:t>
-            </a:r>
-            <a:r>
-              <a:rPr lang="en-US" altLang="zh-CN" dirty="0"/>
-              <a:t>BITCOIN</a:t>
-            </a:r>
-            <a:endParaRPr lang="zh-CN" altLang="en-US" dirty="0"/>
+              <a:t>交易</a:t>
+            </a:r>
           </a:p>
         </p:txBody>
       </p:sp>
@@ -3862,7 +3633,7 @@
           <p:cNvPr id="4" name="内容占位符 3">
             <a:extLst>
               <a:ext uri="{FF2B5EF4-FFF2-40B4-BE49-F238E27FC236}">
-                <a16:creationId xmlns:a16="http://schemas.microsoft.com/office/drawing/2014/main" id="{0128DFB1-2721-4039-9DA4-25955A43EBE1}"/>
+                <a16:creationId xmlns:a16="http://schemas.microsoft.com/office/drawing/2014/main" id="{A307FE7E-8591-49D7-BC22-DC5213928C63}"/>
               </a:ext>
             </a:extLst>
           </p:cNvPr>
@@ -3881,8 +3652,8 @@
         </p:blipFill>
         <p:spPr>
           <a:xfrm>
-            <a:off x="953610" y="2607004"/>
-            <a:ext cx="10515600" cy="1776525"/>
+            <a:off x="1104530" y="2786382"/>
+            <a:ext cx="10515600" cy="1559813"/>
           </a:xfrm>
           <a:prstGeom prst="rect">
             <a:avLst/>
@@ -3892,7 +3663,7 @@
     </p:spTree>
     <p:extLst>
       <p:ext uri="{BB962C8B-B14F-4D97-AF65-F5344CB8AC3E}">
-        <p14:creationId xmlns:p14="http://schemas.microsoft.com/office/powerpoint/2010/main" val="1173544099"/>
+        <p14:creationId xmlns:p14="http://schemas.microsoft.com/office/powerpoint/2010/main" val="1700323753"/>
       </p:ext>
     </p:extLst>
   </p:cSld>
@@ -3902,7 +3673,7 @@
 </p:sld>
 </file>
 
-<file path=ppt/slides/slide14.xml><?xml version="1.0" encoding="utf-8"?>
+<file path=ppt/slides/slide12.xml><?xml version="1.0" encoding="utf-8"?>
 <p:sld xmlns:a="http://schemas.openxmlformats.org/drawingml/2006/main" xmlns:r="http://schemas.openxmlformats.org/officeDocument/2006/relationships" xmlns:p="http://schemas.openxmlformats.org/presentationml/2006/main">
   <p:cSld>
     <p:spTree>
@@ -3953,10 +3724,10 @@
       </p:sp>
       <p:pic>
         <p:nvPicPr>
-          <p:cNvPr id="4" name="图片 3">
-            <a:extLst>
-              <a:ext uri="{FF2B5EF4-FFF2-40B4-BE49-F238E27FC236}">
-                <a16:creationId xmlns:a16="http://schemas.microsoft.com/office/drawing/2014/main" id="{3D44E310-06E4-4458-8607-CFAEA113BA6D}"/>
+          <p:cNvPr id="2" name="图片 1">
+            <a:extLst>
+              <a:ext uri="{FF2B5EF4-FFF2-40B4-BE49-F238E27FC236}">
+                <a16:creationId xmlns:a16="http://schemas.microsoft.com/office/drawing/2014/main" id="{7AC4D451-5347-44EC-B1D5-7A8339F389A2}"/>
               </a:ext>
             </a:extLst>
           </p:cNvPr>
@@ -3973,38 +3744,8 @@
         </p:blipFill>
         <p:spPr>
           <a:xfrm>
-            <a:off x="3714908" y="814854"/>
-            <a:ext cx="3980952" cy="3000000"/>
-          </a:xfrm>
-          <a:prstGeom prst="rect">
-            <a:avLst/>
-          </a:prstGeom>
-        </p:spPr>
-      </p:pic>
-      <p:pic>
-        <p:nvPicPr>
-          <p:cNvPr id="5" name="图片 4">
-            <a:extLst>
-              <a:ext uri="{FF2B5EF4-FFF2-40B4-BE49-F238E27FC236}">
-                <a16:creationId xmlns:a16="http://schemas.microsoft.com/office/drawing/2014/main" id="{2AAF0E57-C4E2-4AC4-B16D-FFF69169741F}"/>
-              </a:ext>
-            </a:extLst>
-          </p:cNvPr>
-          <p:cNvPicPr>
-            <a:picLocks noChangeAspect="1"/>
-          </p:cNvPicPr>
-          <p:nvPr/>
-        </p:nvPicPr>
-        <p:blipFill>
-          <a:blip r:embed="rId3"/>
-          <a:stretch>
-            <a:fillRect/>
-          </a:stretch>
-        </p:blipFill>
-        <p:spPr>
-          <a:xfrm>
-            <a:off x="673093" y="4289362"/>
-            <a:ext cx="11304762" cy="1723810"/>
+            <a:off x="3630148" y="1985423"/>
+            <a:ext cx="4647619" cy="3238095"/>
           </a:xfrm>
           <a:prstGeom prst="rect">
             <a:avLst/>
@@ -4024,9 +3765,127 @@
 </p:sld>
 </file>
 
-<file path=ppt/slides/slide15.xml><?xml version="1.0" encoding="utf-8"?>
+<file path=ppt/slides/slide13.xml><?xml version="1.0" encoding="utf-8"?>
 <p:sld xmlns:a="http://schemas.openxmlformats.org/drawingml/2006/main" xmlns:r="http://schemas.openxmlformats.org/officeDocument/2006/relationships" xmlns:p="http://schemas.openxmlformats.org/presentationml/2006/main">
   <p:cSld>
+    <p:spTree>
+      <p:nvGrpSpPr>
+        <p:cNvPr id="1" name=""/>
+        <p:cNvGrpSpPr/>
+        <p:nvPr/>
+      </p:nvGrpSpPr>
+      <p:grpSpPr>
+        <a:xfrm>
+          <a:off x="0" y="0"/>
+          <a:ext cx="0" cy="0"/>
+          <a:chOff x="0" y="0"/>
+          <a:chExt cx="0" cy="0"/>
+        </a:xfrm>
+      </p:grpSpPr>
+      <p:sp>
+        <p:nvSpPr>
+          <p:cNvPr id="2" name="标题 1">
+            <a:extLst>
+              <a:ext uri="{FF2B5EF4-FFF2-40B4-BE49-F238E27FC236}">
+                <a16:creationId xmlns:a16="http://schemas.microsoft.com/office/drawing/2014/main" id="{56F01BA9-4B71-493E-B6B7-3425CA720E05}"/>
+              </a:ext>
+            </a:extLst>
+          </p:cNvPr>
+          <p:cNvSpPr>
+            <a:spLocks noGrp="1"/>
+          </p:cNvSpPr>
+          <p:nvPr>
+            <p:ph type="title"/>
+          </p:nvPr>
+        </p:nvSpPr>
+        <p:spPr/>
+        <p:txBody>
+          <a:bodyPr/>
+          <a:lstStyle/>
+          <a:p>
+            <a:r>
+              <a:rPr lang="zh-CN" altLang="en-US" dirty="0"/>
+              <a:t>记录账本奖励</a:t>
+            </a:r>
+          </a:p>
+        </p:txBody>
+      </p:sp>
+      <p:pic>
+        <p:nvPicPr>
+          <p:cNvPr id="7" name="图片 6">
+            <a:extLst>
+              <a:ext uri="{FF2B5EF4-FFF2-40B4-BE49-F238E27FC236}">
+                <a16:creationId xmlns:a16="http://schemas.microsoft.com/office/drawing/2014/main" id="{81F18279-857E-4771-8BD6-B0E81A31B3AD}"/>
+              </a:ext>
+            </a:extLst>
+          </p:cNvPr>
+          <p:cNvPicPr>
+            <a:picLocks noChangeAspect="1"/>
+          </p:cNvPicPr>
+          <p:nvPr/>
+        </p:nvPicPr>
+        <p:blipFill>
+          <a:blip r:embed="rId2"/>
+          <a:stretch>
+            <a:fillRect/>
+          </a:stretch>
+        </p:blipFill>
+        <p:spPr>
+          <a:xfrm>
+            <a:off x="715764" y="2015556"/>
+            <a:ext cx="11133333" cy="1495238"/>
+          </a:xfrm>
+          <a:prstGeom prst="rect">
+            <a:avLst/>
+          </a:prstGeom>
+        </p:spPr>
+      </p:pic>
+      <p:sp>
+        <p:nvSpPr>
+          <p:cNvPr id="8" name="内容占位符 7">
+            <a:extLst>
+              <a:ext uri="{FF2B5EF4-FFF2-40B4-BE49-F238E27FC236}">
+                <a16:creationId xmlns:a16="http://schemas.microsoft.com/office/drawing/2014/main" id="{0319EE09-FC79-4494-B8CB-B18EAB134C14}"/>
+              </a:ext>
+            </a:extLst>
+          </p:cNvPr>
+          <p:cNvSpPr>
+            <a:spLocks noGrp="1"/>
+          </p:cNvSpPr>
+          <p:nvPr>
+            <p:ph idx="1"/>
+          </p:nvPr>
+        </p:nvSpPr>
+        <p:spPr/>
+        <p:txBody>
+          <a:bodyPr/>
+          <a:lstStyle/>
+          <a:p>
+            <a:endParaRPr lang="zh-CN" altLang="en-US"/>
+          </a:p>
+        </p:txBody>
+      </p:sp>
+    </p:spTree>
+    <p:extLst>
+      <p:ext uri="{BB962C8B-B14F-4D97-AF65-F5344CB8AC3E}">
+        <p14:creationId xmlns:p14="http://schemas.microsoft.com/office/powerpoint/2010/main" val="1173544099"/>
+      </p:ext>
+    </p:extLst>
+  </p:cSld>
+  <p:clrMapOvr>
+    <a:masterClrMapping/>
+  </p:clrMapOvr>
+</p:sld>
+</file>
+
+<file path=ppt/slides/slide14.xml><?xml version="1.0" encoding="utf-8"?>
+<p:sld xmlns:a="http://schemas.openxmlformats.org/drawingml/2006/main" xmlns:r="http://schemas.openxmlformats.org/officeDocument/2006/relationships" xmlns:p="http://schemas.openxmlformats.org/presentationml/2006/main">
+  <p:cSld>
+    <p:bg>
+      <p:bgRef idx="1001">
+        <a:schemeClr val="bg1"/>
+      </p:bgRef>
+    </p:bg>
     <p:spTree>
       <p:nvGrpSpPr>
         <p:cNvPr id="1" name=""/>
@@ -4058,7 +3917,7 @@
           </p:nvPr>
         </p:nvPicPr>
         <p:blipFill>
-          <a:blip r:embed="rId2"/>
+          <a:blip r:embed="rId3"/>
           <a:stretch>
             <a:fillRect/>
           </a:stretch>
@@ -4081,12 +3940,12 @@
     </p:extLst>
   </p:cSld>
   <p:clrMapOvr>
-    <a:masterClrMapping/>
+    <a:overrideClrMapping bg1="lt1" tx1="dk1" bg2="lt2" tx2="dk2" accent1="accent1" accent2="accent2" accent3="accent3" accent4="accent4" accent5="accent5" accent6="accent6" hlink="hlink" folHlink="folHlink"/>
   </p:clrMapOvr>
 </p:sld>
 </file>
 
-<file path=ppt/slides/slide16.xml><?xml version="1.0" encoding="utf-8"?>
+<file path=ppt/slides/slide15.xml><?xml version="1.0" encoding="utf-8"?>
 <p:sld xmlns:a="http://schemas.openxmlformats.org/drawingml/2006/main" xmlns:r="http://schemas.openxmlformats.org/officeDocument/2006/relationships" xmlns:p="http://schemas.openxmlformats.org/presentationml/2006/main">
   <p:cSld>
     <p:spTree>
@@ -4148,6 +4007,146 @@
 </p:sld>
 </file>
 
+<file path=ppt/slides/slide16.xml><?xml version="1.0" encoding="utf-8"?>
+<p:sld xmlns:a="http://schemas.openxmlformats.org/drawingml/2006/main" xmlns:r="http://schemas.openxmlformats.org/officeDocument/2006/relationships" xmlns:p="http://schemas.openxmlformats.org/presentationml/2006/main">
+  <p:cSld>
+    <p:spTree>
+      <p:nvGrpSpPr>
+        <p:cNvPr id="1" name=""/>
+        <p:cNvGrpSpPr/>
+        <p:nvPr/>
+      </p:nvGrpSpPr>
+      <p:grpSpPr>
+        <a:xfrm>
+          <a:off x="0" y="0"/>
+          <a:ext cx="0" cy="0"/>
+          <a:chOff x="0" y="0"/>
+          <a:chExt cx="0" cy="0"/>
+        </a:xfrm>
+      </p:grpSpPr>
+      <p:sp>
+        <p:nvSpPr>
+          <p:cNvPr id="2" name="标题 1">
+            <a:extLst>
+              <a:ext uri="{FF2B5EF4-FFF2-40B4-BE49-F238E27FC236}">
+                <a16:creationId xmlns:a16="http://schemas.microsoft.com/office/drawing/2014/main" id="{775ECAB7-0C65-4FCD-AD19-CF34F22F6BFF}"/>
+              </a:ext>
+            </a:extLst>
+          </p:cNvPr>
+          <p:cNvSpPr>
+            <a:spLocks noGrp="1"/>
+          </p:cNvSpPr>
+          <p:nvPr>
+            <p:ph type="title"/>
+          </p:nvPr>
+        </p:nvSpPr>
+        <p:spPr/>
+        <p:txBody>
+          <a:bodyPr/>
+          <a:lstStyle/>
+          <a:p>
+            <a:r>
+              <a:rPr lang="zh-CN" altLang="en-US" dirty="0"/>
+              <a:t>挖矿</a:t>
+            </a:r>
+          </a:p>
+        </p:txBody>
+      </p:sp>
+      <p:sp>
+        <p:nvSpPr>
+          <p:cNvPr id="3" name="内容占位符 2">
+            <a:extLst>
+              <a:ext uri="{FF2B5EF4-FFF2-40B4-BE49-F238E27FC236}">
+                <a16:creationId xmlns:a16="http://schemas.microsoft.com/office/drawing/2014/main" id="{1BA94132-C5A9-4A55-98AA-9FC98CC0FD7E}"/>
+              </a:ext>
+            </a:extLst>
+          </p:cNvPr>
+          <p:cNvSpPr>
+            <a:spLocks noGrp="1"/>
+          </p:cNvSpPr>
+          <p:nvPr>
+            <p:ph idx="1"/>
+          </p:nvPr>
+        </p:nvSpPr>
+        <p:spPr>
+          <a:xfrm>
+            <a:off x="2006352" y="2778711"/>
+            <a:ext cx="9347447" cy="3398252"/>
+          </a:xfrm>
+        </p:spPr>
+        <p:txBody>
+          <a:bodyPr/>
+          <a:lstStyle/>
+          <a:p>
+            <a:pPr marL="0" indent="0">
+              <a:buNone/>
+            </a:pPr>
+            <a:r>
+              <a:rPr lang="zh-CN" altLang="en-US" dirty="0"/>
+              <a:t>算力：单位时间</a:t>
+            </a:r>
+            <a:r>
+              <a:rPr lang="en-US" altLang="zh-CN" dirty="0"/>
+              <a:t>hash</a:t>
+            </a:r>
+            <a:r>
+              <a:rPr lang="zh-CN" altLang="en-US" dirty="0"/>
+              <a:t>的次数</a:t>
+            </a:r>
+            <a:endParaRPr lang="en-US" altLang="zh-CN" dirty="0"/>
+          </a:p>
+          <a:p>
+            <a:pPr marL="0" indent="0">
+              <a:buNone/>
+            </a:pPr>
+            <a:r>
+              <a:rPr lang="zh-CN" altLang="en-US" dirty="0"/>
+              <a:t>难度值：</a:t>
+            </a:r>
+            <a:r>
+              <a:rPr lang="en-US" altLang="zh-CN" dirty="0"/>
+              <a:t>nonce</a:t>
+            </a:r>
+          </a:p>
+          <a:p>
+            <a:pPr marL="0" indent="0">
+              <a:buNone/>
+            </a:pPr>
+            <a:r>
+              <a:rPr lang="zh-CN" altLang="en-US" dirty="0"/>
+              <a:t>区块生成速度：平均</a:t>
+            </a:r>
+            <a:r>
+              <a:rPr lang="en-US" altLang="zh-CN" dirty="0"/>
+              <a:t>10</a:t>
+            </a:r>
+            <a:r>
+              <a:rPr lang="zh-CN" altLang="en-US" dirty="0"/>
+              <a:t>分钟产生一个新区块</a:t>
+            </a:r>
+            <a:endParaRPr lang="en-US" altLang="zh-CN" dirty="0"/>
+          </a:p>
+          <a:p>
+            <a:pPr marL="0" indent="0">
+              <a:buNone/>
+            </a:pPr>
+            <a:endParaRPr lang="zh-CN" altLang="en-US" dirty="0"/>
+          </a:p>
+        </p:txBody>
+      </p:sp>
+    </p:spTree>
+    <p:extLst>
+      <p:ext uri="{BB962C8B-B14F-4D97-AF65-F5344CB8AC3E}">
+        <p14:creationId xmlns:p14="http://schemas.microsoft.com/office/powerpoint/2010/main" val="1962184194"/>
+      </p:ext>
+    </p:extLst>
+  </p:cSld>
+  <p:clrMapOvr>
+    <a:masterClrMapping/>
+  </p:clrMapOvr>
+</p:sld>
+</file>
+
 <file path=ppt/slides/slide17.xml><?xml version="1.0" encoding="utf-8"?>
 <p:sld xmlns:a="http://schemas.openxmlformats.org/drawingml/2006/main" xmlns:r="http://schemas.openxmlformats.org/officeDocument/2006/relationships" xmlns:p="http://schemas.openxmlformats.org/presentationml/2006/main">
   <p:cSld>
@@ -4170,7 +4169,7 @@
           <p:cNvPr id="2" name="标题 1">
             <a:extLst>
               <a:ext uri="{FF2B5EF4-FFF2-40B4-BE49-F238E27FC236}">
-                <a16:creationId xmlns:a16="http://schemas.microsoft.com/office/drawing/2014/main" id="{775ECAB7-0C65-4FCD-AD19-CF34F22F6BFF}"/>
+                <a16:creationId xmlns:a16="http://schemas.microsoft.com/office/drawing/2014/main" id="{F56C36F9-4535-486E-B0A9-5A9793F7649C}"/>
               </a:ext>
             </a:extLst>
           </p:cNvPr>
@@ -4181,38 +4180,298 @@
             <p:ph type="title"/>
           </p:nvPr>
         </p:nvSpPr>
-        <p:spPr/>
+        <p:spPr>
+          <a:xfrm>
+            <a:off x="838200" y="365125"/>
+            <a:ext cx="2943687" cy="1325563"/>
+          </a:xfrm>
+        </p:spPr>
         <p:txBody>
           <a:bodyPr/>
           <a:lstStyle/>
           <a:p>
             <a:r>
               <a:rPr lang="zh-CN" altLang="en-US" dirty="0"/>
-              <a:t>挖矿</a:t>
-            </a:r>
-          </a:p>
-        </p:txBody>
-      </p:sp>
-      <p:sp>
-        <p:nvSpPr>
-          <p:cNvPr id="3" name="内容占位符 2">
-            <a:extLst>
-              <a:ext uri="{FF2B5EF4-FFF2-40B4-BE49-F238E27FC236}">
-                <a16:creationId xmlns:a16="http://schemas.microsoft.com/office/drawing/2014/main" id="{1BA94132-C5A9-4A55-98AA-9FC98CC0FD7E}"/>
-              </a:ext>
-            </a:extLst>
-          </p:cNvPr>
-          <p:cNvSpPr>
-            <a:spLocks noGrp="1"/>
-          </p:cNvSpPr>
+              <a:t>新块产生</a:t>
+            </a:r>
+          </a:p>
+        </p:txBody>
+      </p:sp>
+      <p:pic>
+        <p:nvPicPr>
+          <p:cNvPr id="5" name="内容占位符 4">
+            <a:extLst>
+              <a:ext uri="{FF2B5EF4-FFF2-40B4-BE49-F238E27FC236}">
+                <a16:creationId xmlns:a16="http://schemas.microsoft.com/office/drawing/2014/main" id="{F354A075-297F-46E4-99E8-349BC280082C}"/>
+              </a:ext>
+            </a:extLst>
+          </p:cNvPr>
+          <p:cNvPicPr>
+            <a:picLocks noGrp="1" noChangeAspect="1"/>
+          </p:cNvPicPr>
           <p:nvPr>
             <p:ph idx="1"/>
           </p:nvPr>
-        </p:nvSpPr>
-        <p:spPr/>
-        <p:txBody>
-          <a:bodyPr/>
-          <a:lstStyle/>
+        </p:nvPicPr>
+        <p:blipFill>
+          <a:blip r:embed="rId2">
+            <a:extLst>
+              <a:ext uri="{28A0092B-C50C-407E-A947-70E740481C1C}">
+                <a14:useLocalDpi xmlns:a14="http://schemas.microsoft.com/office/drawing/2010/main" val="0"/>
+              </a:ext>
+            </a:extLst>
+          </a:blip>
+          <a:stretch>
+            <a:fillRect/>
+          </a:stretch>
+        </p:blipFill>
+        <p:spPr>
+          <a:xfrm>
+            <a:off x="3781887" y="488271"/>
+            <a:ext cx="6752280" cy="3941686"/>
+          </a:xfrm>
+        </p:spPr>
+      </p:pic>
+      <p:sp>
+        <p:nvSpPr>
+          <p:cNvPr id="4" name="内容占位符 4">
+            <a:extLst>
+              <a:ext uri="{FF2B5EF4-FFF2-40B4-BE49-F238E27FC236}">
+                <a16:creationId xmlns:a16="http://schemas.microsoft.com/office/drawing/2014/main" id="{459A5705-BF7E-4AC2-91F5-F90DFC14E4E2}"/>
+              </a:ext>
+            </a:extLst>
+          </p:cNvPr>
+          <p:cNvSpPr txBox="1">
+            <a:spLocks/>
+          </p:cNvSpPr>
+          <p:nvPr/>
+        </p:nvSpPr>
+        <p:spPr>
+          <a:xfrm>
+            <a:off x="4322684" y="4900472"/>
+            <a:ext cx="6924584" cy="1072303"/>
+          </a:xfrm>
+          <a:prstGeom prst="rect">
+            <a:avLst/>
+          </a:prstGeom>
+        </p:spPr>
+        <p:txBody>
+          <a:bodyPr vert="horz" lIns="91440" tIns="45720" rIns="91440" bIns="45720" rtlCol="0">
+            <a:normAutofit fontScale="47500" lnSpcReduction="20000"/>
+          </a:bodyPr>
+          <a:lstStyle>
+            <a:lvl1pPr marL="228600" indent="-228600" algn="l" defTabSz="914400" rtl="0" eaLnBrk="1" latinLnBrk="0" hangingPunct="1">
+              <a:lnSpc>
+                <a:spcPct val="90000"/>
+              </a:lnSpc>
+              <a:spcBef>
+                <a:spcPts val="1000"/>
+              </a:spcBef>
+              <a:buFont typeface="Arial" panose="020B0604020202020204" pitchFamily="34" charset="0"/>
+              <a:buChar char="•"/>
+              <a:defRPr sz="2800" kern="1200">
+                <a:solidFill>
+                  <a:schemeClr val="tx1"/>
+                </a:solidFill>
+                <a:latin typeface="+mn-lt"/>
+                <a:ea typeface="+mn-ea"/>
+                <a:cs typeface="+mn-cs"/>
+              </a:defRPr>
+            </a:lvl1pPr>
+            <a:lvl2pPr marL="685800" indent="-228600" algn="l" defTabSz="914400" rtl="0" eaLnBrk="1" latinLnBrk="0" hangingPunct="1">
+              <a:lnSpc>
+                <a:spcPct val="90000"/>
+              </a:lnSpc>
+              <a:spcBef>
+                <a:spcPts val="500"/>
+              </a:spcBef>
+              <a:buFont typeface="Arial" panose="020B0604020202020204" pitchFamily="34" charset="0"/>
+              <a:buChar char="•"/>
+              <a:defRPr sz="2400" kern="1200">
+                <a:solidFill>
+                  <a:schemeClr val="tx1"/>
+                </a:solidFill>
+                <a:latin typeface="+mn-lt"/>
+                <a:ea typeface="+mn-ea"/>
+                <a:cs typeface="+mn-cs"/>
+              </a:defRPr>
+            </a:lvl2pPr>
+            <a:lvl3pPr marL="1143000" indent="-228600" algn="l" defTabSz="914400" rtl="0" eaLnBrk="1" latinLnBrk="0" hangingPunct="1">
+              <a:lnSpc>
+                <a:spcPct val="90000"/>
+              </a:lnSpc>
+              <a:spcBef>
+                <a:spcPts val="500"/>
+              </a:spcBef>
+              <a:buFont typeface="Arial" panose="020B0604020202020204" pitchFamily="34" charset="0"/>
+              <a:buChar char="•"/>
+              <a:defRPr sz="2000" kern="1200">
+                <a:solidFill>
+                  <a:schemeClr val="tx1"/>
+                </a:solidFill>
+                <a:latin typeface="+mn-lt"/>
+                <a:ea typeface="+mn-ea"/>
+                <a:cs typeface="+mn-cs"/>
+              </a:defRPr>
+            </a:lvl3pPr>
+            <a:lvl4pPr marL="1600200" indent="-228600" algn="l" defTabSz="914400" rtl="0" eaLnBrk="1" latinLnBrk="0" hangingPunct="1">
+              <a:lnSpc>
+                <a:spcPct val="90000"/>
+              </a:lnSpc>
+              <a:spcBef>
+                <a:spcPts val="500"/>
+              </a:spcBef>
+              <a:buFont typeface="Arial" panose="020B0604020202020204" pitchFamily="34" charset="0"/>
+              <a:buChar char="•"/>
+              <a:defRPr sz="1800" kern="1200">
+                <a:solidFill>
+                  <a:schemeClr val="tx1"/>
+                </a:solidFill>
+                <a:latin typeface="+mn-lt"/>
+                <a:ea typeface="+mn-ea"/>
+                <a:cs typeface="+mn-cs"/>
+              </a:defRPr>
+            </a:lvl4pPr>
+            <a:lvl5pPr marL="2057400" indent="-228600" algn="l" defTabSz="914400" rtl="0" eaLnBrk="1" latinLnBrk="0" hangingPunct="1">
+              <a:lnSpc>
+                <a:spcPct val="90000"/>
+              </a:lnSpc>
+              <a:spcBef>
+                <a:spcPts val="500"/>
+              </a:spcBef>
+              <a:buFont typeface="Arial" panose="020B0604020202020204" pitchFamily="34" charset="0"/>
+              <a:buChar char="•"/>
+              <a:defRPr sz="1800" kern="1200">
+                <a:solidFill>
+                  <a:schemeClr val="tx1"/>
+                </a:solidFill>
+                <a:latin typeface="+mn-lt"/>
+                <a:ea typeface="+mn-ea"/>
+                <a:cs typeface="+mn-cs"/>
+              </a:defRPr>
+            </a:lvl5pPr>
+            <a:lvl6pPr marL="2514600" indent="-228600" algn="l" defTabSz="914400" rtl="0" eaLnBrk="1" latinLnBrk="0" hangingPunct="1">
+              <a:lnSpc>
+                <a:spcPct val="90000"/>
+              </a:lnSpc>
+              <a:spcBef>
+                <a:spcPts val="500"/>
+              </a:spcBef>
+              <a:buFont typeface="Arial" panose="020B0604020202020204" pitchFamily="34" charset="0"/>
+              <a:buChar char="•"/>
+              <a:defRPr sz="1800" kern="1200">
+                <a:solidFill>
+                  <a:schemeClr val="tx1"/>
+                </a:solidFill>
+                <a:latin typeface="+mn-lt"/>
+                <a:ea typeface="+mn-ea"/>
+                <a:cs typeface="+mn-cs"/>
+              </a:defRPr>
+            </a:lvl6pPr>
+            <a:lvl7pPr marL="2971800" indent="-228600" algn="l" defTabSz="914400" rtl="0" eaLnBrk="1" latinLnBrk="0" hangingPunct="1">
+              <a:lnSpc>
+                <a:spcPct val="90000"/>
+              </a:lnSpc>
+              <a:spcBef>
+                <a:spcPts val="500"/>
+              </a:spcBef>
+              <a:buFont typeface="Arial" panose="020B0604020202020204" pitchFamily="34" charset="0"/>
+              <a:buChar char="•"/>
+              <a:defRPr sz="1800" kern="1200">
+                <a:solidFill>
+                  <a:schemeClr val="tx1"/>
+                </a:solidFill>
+                <a:latin typeface="+mn-lt"/>
+                <a:ea typeface="+mn-ea"/>
+                <a:cs typeface="+mn-cs"/>
+              </a:defRPr>
+            </a:lvl7pPr>
+            <a:lvl8pPr marL="3429000" indent="-228600" algn="l" defTabSz="914400" rtl="0" eaLnBrk="1" latinLnBrk="0" hangingPunct="1">
+              <a:lnSpc>
+                <a:spcPct val="90000"/>
+              </a:lnSpc>
+              <a:spcBef>
+                <a:spcPts val="500"/>
+              </a:spcBef>
+              <a:buFont typeface="Arial" panose="020B0604020202020204" pitchFamily="34" charset="0"/>
+              <a:buChar char="•"/>
+              <a:defRPr sz="1800" kern="1200">
+                <a:solidFill>
+                  <a:schemeClr val="tx1"/>
+                </a:solidFill>
+                <a:latin typeface="+mn-lt"/>
+                <a:ea typeface="+mn-ea"/>
+                <a:cs typeface="+mn-cs"/>
+              </a:defRPr>
+            </a:lvl8pPr>
+            <a:lvl9pPr marL="3886200" indent="-228600" algn="l" defTabSz="914400" rtl="0" eaLnBrk="1" latinLnBrk="0" hangingPunct="1">
+              <a:lnSpc>
+                <a:spcPct val="90000"/>
+              </a:lnSpc>
+              <a:spcBef>
+                <a:spcPts val="500"/>
+              </a:spcBef>
+              <a:buFont typeface="Arial" panose="020B0604020202020204" pitchFamily="34" charset="0"/>
+              <a:buChar char="•"/>
+              <a:defRPr sz="1800" kern="1200">
+                <a:solidFill>
+                  <a:schemeClr val="tx1"/>
+                </a:solidFill>
+                <a:latin typeface="+mn-lt"/>
+                <a:ea typeface="+mn-ea"/>
+                <a:cs typeface="+mn-cs"/>
+              </a:defRPr>
+            </a:lvl9pPr>
+          </a:lstStyle>
+          <a:p>
+            <a:r>
+              <a:rPr lang="en-US" altLang="zh-CN" dirty="0"/>
+              <a:t>Bitcoin</a:t>
+            </a:r>
+            <a:r>
+              <a:rPr lang="zh-CN" altLang="en-US" dirty="0"/>
+              <a:t>货币发行：账本奖励</a:t>
+            </a:r>
+            <a:endParaRPr lang="en-US" altLang="zh-CN" dirty="0"/>
+          </a:p>
+          <a:p>
+            <a:r>
+              <a:rPr lang="zh-CN" altLang="en-US" dirty="0"/>
+              <a:t>奖励递减</a:t>
+            </a:r>
+            <a:endParaRPr lang="en-US" altLang="zh-CN" dirty="0"/>
+          </a:p>
+          <a:p>
+            <a:r>
+              <a:rPr lang="zh-CN" altLang="en-US" dirty="0"/>
+              <a:t>总数：</a:t>
+            </a:r>
+            <a:r>
+              <a:rPr lang="en-US" altLang="zh-CN" dirty="0"/>
+              <a:t>2100W</a:t>
+            </a:r>
+          </a:p>
+          <a:p>
+            <a:r>
+              <a:rPr lang="zh-CN" altLang="en-US" dirty="0"/>
+              <a:t>区块生成速度：平均</a:t>
+            </a:r>
+            <a:r>
+              <a:rPr lang="en-US" altLang="zh-CN" dirty="0"/>
+              <a:t>10</a:t>
+            </a:r>
+            <a:r>
+              <a:rPr lang="zh-CN" altLang="en-US" dirty="0"/>
+              <a:t>分钟产生一个新区块</a:t>
+            </a:r>
+            <a:endParaRPr lang="en-US" altLang="zh-CN" dirty="0"/>
+          </a:p>
+          <a:p>
+            <a:pPr marL="0" indent="0">
+              <a:buNone/>
+            </a:pPr>
+            <a:endParaRPr lang="en-US" altLang="zh-CN" dirty="0"/>
+          </a:p>
           <a:p>
             <a:endParaRPr lang="zh-CN" altLang="en-US" dirty="0"/>
           </a:p>
@@ -4221,13 +4480,99 @@
     </p:spTree>
     <p:extLst>
       <p:ext uri="{BB962C8B-B14F-4D97-AF65-F5344CB8AC3E}">
-        <p14:creationId xmlns:p14="http://schemas.microsoft.com/office/powerpoint/2010/main" val="1962184194"/>
+        <p14:creationId xmlns:p14="http://schemas.microsoft.com/office/powerpoint/2010/main" val="766144630"/>
       </p:ext>
     </p:extLst>
   </p:cSld>
   <p:clrMapOvr>
     <a:masterClrMapping/>
   </p:clrMapOvr>
+  <p:timing>
+    <p:tnLst>
+      <p:par>
+        <p:cTn id="1" dur="indefinite" restart="never" nodeType="tmRoot">
+          <p:childTnLst>
+            <p:seq concurrent="1" nextAc="seek">
+              <p:cTn id="2" dur="indefinite" nodeType="mainSeq">
+                <p:childTnLst>
+                  <p:par>
+                    <p:cTn id="3" fill="hold">
+                      <p:stCondLst>
+                        <p:cond delay="indefinite"/>
+                      </p:stCondLst>
+                      <p:childTnLst>
+                        <p:par>
+                          <p:cTn id="4" fill="hold">
+                            <p:stCondLst>
+                              <p:cond delay="0"/>
+                            </p:stCondLst>
+                            <p:childTnLst>
+                              <p:par>
+                                <p:cTn id="5" presetID="10" presetClass="entr" presetSubtype="0" fill="hold" grpId="0" nodeType="clickEffect">
+                                  <p:stCondLst>
+                                    <p:cond delay="0"/>
+                                  </p:stCondLst>
+                                  <p:childTnLst>
+                                    <p:set>
+                                      <p:cBhvr>
+                                        <p:cTn id="6" dur="1" fill="hold">
+                                          <p:stCondLst>
+                                            <p:cond delay="0"/>
+                                          </p:stCondLst>
+                                        </p:cTn>
+                                        <p:tgtEl>
+                                          <p:spTgt spid="4"/>
+                                        </p:tgtEl>
+                                        <p:attrNameLst>
+                                          <p:attrName>style.visibility</p:attrName>
+                                        </p:attrNameLst>
+                                      </p:cBhvr>
+                                      <p:to>
+                                        <p:strVal val="visible"/>
+                                      </p:to>
+                                    </p:set>
+                                    <p:animEffect transition="in" filter="fade">
+                                      <p:cBhvr>
+                                        <p:cTn id="7" dur="500"/>
+                                        <p:tgtEl>
+                                          <p:spTgt spid="4"/>
+                                        </p:tgtEl>
+                                      </p:cBhvr>
+                                    </p:animEffect>
+                                  </p:childTnLst>
+                                </p:cTn>
+                              </p:par>
+                            </p:childTnLst>
+                          </p:cTn>
+                        </p:par>
+                      </p:childTnLst>
+                    </p:cTn>
+                  </p:par>
+                </p:childTnLst>
+              </p:cTn>
+              <p:prevCondLst>
+                <p:cond evt="onPrev" delay="0">
+                  <p:tgtEl>
+                    <p:sldTgt/>
+                  </p:tgtEl>
+                </p:cond>
+              </p:prevCondLst>
+              <p:nextCondLst>
+                <p:cond evt="onNext" delay="0">
+                  <p:tgtEl>
+                    <p:sldTgt/>
+                  </p:tgtEl>
+                </p:cond>
+              </p:nextCondLst>
+            </p:seq>
+          </p:childTnLst>
+        </p:cTn>
+      </p:par>
+    </p:tnLst>
+    <p:bldLst>
+      <p:bldP spid="4" grpId="0"/>
+    </p:bldLst>
+  </p:timing>
 </p:sld>
 </file>
 
@@ -4253,7 +4598,7 @@
           <p:cNvPr id="2" name="标题 1">
             <a:extLst>
               <a:ext uri="{FF2B5EF4-FFF2-40B4-BE49-F238E27FC236}">
-                <a16:creationId xmlns:a16="http://schemas.microsoft.com/office/drawing/2014/main" id="{F56C36F9-4535-486E-B0A9-5A9793F7649C}"/>
+                <a16:creationId xmlns:a16="http://schemas.microsoft.com/office/drawing/2014/main" id="{286BDE00-A4F0-4B41-A8ED-20EB327E33A9}"/>
               </a:ext>
             </a:extLst>
           </p:cNvPr>
@@ -4269,34 +4614,7 @@
           <a:bodyPr/>
           <a:lstStyle/>
           <a:p>
-            <a:r>
-              <a:rPr lang="zh-CN" altLang="en-US" dirty="0"/>
-              <a:t>创世区（</a:t>
-            </a:r>
-            <a:r>
-              <a:rPr lang="en-US" altLang="zh-CN" dirty="0" err="1"/>
-              <a:t>geneis</a:t>
-            </a:r>
-            <a:r>
-              <a:rPr lang="zh-CN" altLang="en-US" dirty="0"/>
-              <a:t>）</a:t>
-            </a:r>
-            <a:r>
-              <a:rPr lang="en-US" altLang="zh-CN" dirty="0"/>
-              <a:t>,</a:t>
-            </a:r>
-            <a:r>
-              <a:rPr lang="zh-CN" altLang="en-US" dirty="0"/>
-              <a:t>前后节点之间相互的连接 </a:t>
-            </a:r>
-            <a:r>
-              <a:rPr lang="en-US" altLang="zh-CN" dirty="0"/>
-              <a:t>,</a:t>
-            </a:r>
-            <a:r>
-              <a:rPr lang="zh-CN" altLang="en-US" dirty="0"/>
-              <a:t>难度调整</a:t>
-            </a:r>
+            <a:endParaRPr lang="zh-CN" altLang="en-US"/>
           </a:p>
         </p:txBody>
       </p:sp>
@@ -4305,7 +4623,7 @@
           <p:cNvPr id="3" name="内容占位符 2">
             <a:extLst>
               <a:ext uri="{FF2B5EF4-FFF2-40B4-BE49-F238E27FC236}">
-                <a16:creationId xmlns:a16="http://schemas.microsoft.com/office/drawing/2014/main" id="{E3889C37-D9E9-402C-8972-A060ED855CAA}"/>
+                <a16:creationId xmlns:a16="http://schemas.microsoft.com/office/drawing/2014/main" id="{7576AF61-BDB3-4539-8396-E94FD04C3935}"/>
               </a:ext>
             </a:extLst>
           </p:cNvPr>
@@ -4321,20 +4639,216 @@
           <a:bodyPr/>
           <a:lstStyle/>
           <a:p>
-            <a:endParaRPr lang="zh-CN" altLang="en-US" dirty="0"/>
-          </a:p>
-        </p:txBody>
-      </p:sp>
+            <a:endParaRPr lang="zh-CN" altLang="en-US"/>
+          </a:p>
+        </p:txBody>
+      </p:sp>
+      <p:pic>
+        <p:nvPicPr>
+          <p:cNvPr id="4" name="图片 3">
+            <a:extLst>
+              <a:ext uri="{FF2B5EF4-FFF2-40B4-BE49-F238E27FC236}">
+                <a16:creationId xmlns:a16="http://schemas.microsoft.com/office/drawing/2014/main" id="{6BD9A79C-DB6D-49BA-AD4B-16831C2AED59}"/>
+              </a:ext>
+            </a:extLst>
+          </p:cNvPr>
+          <p:cNvPicPr>
+            <a:picLocks noChangeAspect="1"/>
+          </p:cNvPicPr>
+          <p:nvPr/>
+        </p:nvPicPr>
+        <p:blipFill>
+          <a:blip r:embed="rId2"/>
+          <a:stretch>
+            <a:fillRect/>
+          </a:stretch>
+        </p:blipFill>
+        <p:spPr>
+          <a:xfrm>
+            <a:off x="2165011" y="196633"/>
+            <a:ext cx="7666667" cy="3428571"/>
+          </a:xfrm>
+          <a:prstGeom prst="rect">
+            <a:avLst/>
+          </a:prstGeom>
+        </p:spPr>
+      </p:pic>
+      <p:pic>
+        <p:nvPicPr>
+          <p:cNvPr id="5" name="图片 4">
+            <a:extLst>
+              <a:ext uri="{FF2B5EF4-FFF2-40B4-BE49-F238E27FC236}">
+                <a16:creationId xmlns:a16="http://schemas.microsoft.com/office/drawing/2014/main" id="{3BC76DDC-62E4-4AE0-9B6B-456F9A84312E}"/>
+              </a:ext>
+            </a:extLst>
+          </p:cNvPr>
+          <p:cNvPicPr>
+            <a:picLocks noChangeAspect="1"/>
+          </p:cNvPicPr>
+          <p:nvPr/>
+        </p:nvPicPr>
+        <p:blipFill>
+          <a:blip r:embed="rId3"/>
+          <a:stretch>
+            <a:fillRect/>
+          </a:stretch>
+        </p:blipFill>
+        <p:spPr>
+          <a:xfrm>
+            <a:off x="2210286" y="3600857"/>
+            <a:ext cx="7771428" cy="3257143"/>
+          </a:xfrm>
+          <a:prstGeom prst="rect">
+            <a:avLst/>
+          </a:prstGeom>
+        </p:spPr>
+      </p:pic>
     </p:spTree>
     <p:extLst>
       <p:ext uri="{BB962C8B-B14F-4D97-AF65-F5344CB8AC3E}">
-        <p14:creationId xmlns:p14="http://schemas.microsoft.com/office/powerpoint/2010/main" val="1860049275"/>
+        <p14:creationId xmlns:p14="http://schemas.microsoft.com/office/powerpoint/2010/main" val="1112493813"/>
       </p:ext>
     </p:extLst>
   </p:cSld>
   <p:clrMapOvr>
     <a:masterClrMapping/>
   </p:clrMapOvr>
+  <p:timing>
+    <p:tnLst>
+      <p:par>
+        <p:cTn id="1" dur="indefinite" restart="never" nodeType="tmRoot">
+          <p:childTnLst>
+            <p:seq concurrent="1" nextAc="seek">
+              <p:cTn id="2" dur="indefinite" nodeType="mainSeq">
+                <p:childTnLst>
+                  <p:par>
+                    <p:cTn id="3" fill="hold">
+                      <p:stCondLst>
+                        <p:cond delay="indefinite"/>
+                      </p:stCondLst>
+                      <p:childTnLst>
+                        <p:par>
+                          <p:cTn id="4" fill="hold">
+                            <p:stCondLst>
+                              <p:cond delay="0"/>
+                            </p:stCondLst>
+                            <p:childTnLst>
+                              <p:par>
+                                <p:cTn id="5" presetID="10" presetClass="entr" presetSubtype="0" fill="hold" nodeType="clickEffect">
+                                  <p:stCondLst>
+                                    <p:cond delay="0"/>
+                                  </p:stCondLst>
+                                  <p:childTnLst>
+                                    <p:set>
+                                      <p:cBhvr>
+                                        <p:cTn id="6" dur="1" fill="hold">
+                                          <p:stCondLst>
+                                            <p:cond delay="0"/>
+                                          </p:stCondLst>
+                                        </p:cTn>
+                                        <p:tgtEl>
+                                          <p:spTgt spid="4"/>
+                                        </p:tgtEl>
+                                        <p:attrNameLst>
+                                          <p:attrName>style.visibility</p:attrName>
+                                        </p:attrNameLst>
+                                      </p:cBhvr>
+                                      <p:to>
+                                        <p:strVal val="visible"/>
+                                      </p:to>
+                                    </p:set>
+                                    <p:animEffect transition="in" filter="fade">
+                                      <p:cBhvr>
+                                        <p:cTn id="7" dur="500"/>
+                                        <p:tgtEl>
+                                          <p:spTgt spid="4"/>
+                                        </p:tgtEl>
+                                      </p:cBhvr>
+                                    </p:animEffect>
+                                  </p:childTnLst>
+                                </p:cTn>
+                              </p:par>
+                            </p:childTnLst>
+                          </p:cTn>
+                        </p:par>
+                      </p:childTnLst>
+                    </p:cTn>
+                  </p:par>
+                  <p:par>
+                    <p:cTn id="8" fill="hold">
+                      <p:stCondLst>
+                        <p:cond delay="indefinite"/>
+                      </p:stCondLst>
+                      <p:childTnLst>
+                        <p:par>
+                          <p:cTn id="9" fill="hold">
+                            <p:stCondLst>
+                              <p:cond delay="0"/>
+                            </p:stCondLst>
+                            <p:childTnLst>
+                              <p:par>
+                                <p:cTn id="10" presetID="10" presetClass="entr" presetSubtype="0" fill="hold" nodeType="clickEffect">
+                                  <p:stCondLst>
+                                    <p:cond delay="0"/>
+                                  </p:stCondLst>
+                                  <p:childTnLst>
+                                    <p:set>
+                                      <p:cBhvr>
+                                        <p:cTn id="11" dur="1" fill="hold">
+                                          <p:stCondLst>
+                                            <p:cond delay="0"/>
+                                          </p:stCondLst>
+                                        </p:cTn>
+                                        <p:tgtEl>
+                                          <p:spTgt spid="5"/>
+                                        </p:tgtEl>
+                                        <p:attrNameLst>
+                                          <p:attrName>style.visibility</p:attrName>
+                                        </p:attrNameLst>
+                                      </p:cBhvr>
+                                      <p:to>
+                                        <p:strVal val="visible"/>
+                                      </p:to>
+                                    </p:set>
+                                    <p:animEffect transition="in" filter="fade">
+                                      <p:cBhvr>
+                                        <p:cTn id="12" dur="500"/>
+                                        <p:tgtEl>
+                                          <p:spTgt spid="5"/>
+                                        </p:tgtEl>
+                                      </p:cBhvr>
+                                    </p:animEffect>
+                                  </p:childTnLst>
+                                </p:cTn>
+                              </p:par>
+                            </p:childTnLst>
+                          </p:cTn>
+                        </p:par>
+                      </p:childTnLst>
+                    </p:cTn>
+                  </p:par>
+                </p:childTnLst>
+              </p:cTn>
+              <p:prevCondLst>
+                <p:cond evt="onPrev" delay="0">
+                  <p:tgtEl>
+                    <p:sldTgt/>
+                  </p:tgtEl>
+                </p:cond>
+              </p:prevCondLst>
+              <p:nextCondLst>
+                <p:cond evt="onNext" delay="0">
+                  <p:tgtEl>
+                    <p:sldTgt/>
+                  </p:tgtEl>
+                </p:cond>
+              </p:nextCondLst>
+            </p:seq>
+          </p:childTnLst>
+        </p:cTn>
+      </p:par>
+    </p:tnLst>
+  </p:timing>
 </p:sld>
 </file>
 
@@ -4360,7 +4874,7 @@
           <p:cNvPr id="2" name="标题 1">
             <a:extLst>
               <a:ext uri="{FF2B5EF4-FFF2-40B4-BE49-F238E27FC236}">
-                <a16:creationId xmlns:a16="http://schemas.microsoft.com/office/drawing/2014/main" id="{F56C36F9-4535-486E-B0A9-5A9793F7649C}"/>
+                <a16:creationId xmlns:a16="http://schemas.microsoft.com/office/drawing/2014/main" id="{8B515EE1-3137-4D91-AE7E-79CF1EA90689}"/>
               </a:ext>
             </a:extLst>
           </p:cNvPr>
@@ -4378,46 +4892,468 @@
           <a:p>
             <a:r>
               <a:rPr lang="zh-CN" altLang="en-US" dirty="0"/>
-              <a:t>从头回顾一下原理</a:t>
-            </a:r>
-          </a:p>
-        </p:txBody>
-      </p:sp>
-      <p:sp>
-        <p:nvSpPr>
-          <p:cNvPr id="3" name="内容占位符 2">
-            <a:extLst>
-              <a:ext uri="{FF2B5EF4-FFF2-40B4-BE49-F238E27FC236}">
-                <a16:creationId xmlns:a16="http://schemas.microsoft.com/office/drawing/2014/main" id="{E3889C37-D9E9-402C-8972-A060ED855CAA}"/>
-              </a:ext>
-            </a:extLst>
-          </p:cNvPr>
-          <p:cNvSpPr>
-            <a:spLocks noGrp="1"/>
-          </p:cNvSpPr>
+              <a:t>共识与分叉</a:t>
+            </a:r>
+          </a:p>
+        </p:txBody>
+      </p:sp>
+      <p:pic>
+        <p:nvPicPr>
+          <p:cNvPr id="4" name="内容占位符 3">
+            <a:extLst>
+              <a:ext uri="{FF2B5EF4-FFF2-40B4-BE49-F238E27FC236}">
+                <a16:creationId xmlns:a16="http://schemas.microsoft.com/office/drawing/2014/main" id="{B73E28AD-0699-4912-B3EC-0A4BDEAC33D0}"/>
+              </a:ext>
+            </a:extLst>
+          </p:cNvPr>
+          <p:cNvPicPr>
+            <a:picLocks noGrp="1" noChangeAspect="1"/>
+          </p:cNvPicPr>
           <p:nvPr>
             <p:ph idx="1"/>
           </p:nvPr>
-        </p:nvSpPr>
-        <p:spPr/>
-        <p:txBody>
-          <a:bodyPr/>
-          <a:lstStyle/>
-          <a:p>
-            <a:endParaRPr lang="zh-CN" altLang="en-US"/>
-          </a:p>
-        </p:txBody>
-      </p:sp>
+        </p:nvPicPr>
+        <p:blipFill>
+          <a:blip r:embed="rId2"/>
+          <a:stretch>
+            <a:fillRect/>
+          </a:stretch>
+        </p:blipFill>
+        <p:spPr>
+          <a:xfrm>
+            <a:off x="1886476" y="1690688"/>
+            <a:ext cx="8419048" cy="4047619"/>
+          </a:xfrm>
+          <a:prstGeom prst="rect">
+            <a:avLst/>
+          </a:prstGeom>
+        </p:spPr>
+      </p:pic>
+      <p:pic>
+        <p:nvPicPr>
+          <p:cNvPr id="5" name="图片 4">
+            <a:extLst>
+              <a:ext uri="{FF2B5EF4-FFF2-40B4-BE49-F238E27FC236}">
+                <a16:creationId xmlns:a16="http://schemas.microsoft.com/office/drawing/2014/main" id="{0EC63D30-89D6-41F8-B450-0579AF933306}"/>
+              </a:ext>
+            </a:extLst>
+          </p:cNvPr>
+          <p:cNvPicPr>
+            <a:picLocks noChangeAspect="1"/>
+          </p:cNvPicPr>
+          <p:nvPr/>
+        </p:nvPicPr>
+        <p:blipFill>
+          <a:blip r:embed="rId3"/>
+          <a:stretch>
+            <a:fillRect/>
+          </a:stretch>
+        </p:blipFill>
+        <p:spPr>
+          <a:xfrm>
+            <a:off x="1886476" y="1585926"/>
+            <a:ext cx="7761905" cy="4152381"/>
+          </a:xfrm>
+          <a:prstGeom prst="rect">
+            <a:avLst/>
+          </a:prstGeom>
+        </p:spPr>
+      </p:pic>
+      <p:pic>
+        <p:nvPicPr>
+          <p:cNvPr id="6" name="图片 5">
+            <a:extLst>
+              <a:ext uri="{FF2B5EF4-FFF2-40B4-BE49-F238E27FC236}">
+                <a16:creationId xmlns:a16="http://schemas.microsoft.com/office/drawing/2014/main" id="{C4C46550-BCB6-4762-8DC5-F34DC7D7F9EC}"/>
+              </a:ext>
+            </a:extLst>
+          </p:cNvPr>
+          <p:cNvPicPr>
+            <a:picLocks noChangeAspect="1"/>
+          </p:cNvPicPr>
+          <p:nvPr/>
+        </p:nvPicPr>
+        <p:blipFill>
+          <a:blip r:embed="rId4"/>
+          <a:stretch>
+            <a:fillRect/>
+          </a:stretch>
+        </p:blipFill>
+        <p:spPr>
+          <a:xfrm>
+            <a:off x="1757904" y="1795450"/>
+            <a:ext cx="8019048" cy="4114286"/>
+          </a:xfrm>
+          <a:prstGeom prst="rect">
+            <a:avLst/>
+          </a:prstGeom>
+        </p:spPr>
+      </p:pic>
+      <p:pic>
+        <p:nvPicPr>
+          <p:cNvPr id="7" name="图片 6">
+            <a:extLst>
+              <a:ext uri="{FF2B5EF4-FFF2-40B4-BE49-F238E27FC236}">
+                <a16:creationId xmlns:a16="http://schemas.microsoft.com/office/drawing/2014/main" id="{7E76F552-2806-4576-9769-43A62174CAA1}"/>
+              </a:ext>
+            </a:extLst>
+          </p:cNvPr>
+          <p:cNvPicPr>
+            <a:picLocks noChangeAspect="1"/>
+          </p:cNvPicPr>
+          <p:nvPr/>
+        </p:nvPicPr>
+        <p:blipFill>
+          <a:blip r:embed="rId5"/>
+          <a:stretch>
+            <a:fillRect/>
+          </a:stretch>
+        </p:blipFill>
+        <p:spPr>
+          <a:xfrm>
+            <a:off x="1757904" y="1957355"/>
+            <a:ext cx="7714286" cy="3885714"/>
+          </a:xfrm>
+          <a:prstGeom prst="rect">
+            <a:avLst/>
+          </a:prstGeom>
+        </p:spPr>
+      </p:pic>
+      <p:pic>
+        <p:nvPicPr>
+          <p:cNvPr id="8" name="图片 7">
+            <a:extLst>
+              <a:ext uri="{FF2B5EF4-FFF2-40B4-BE49-F238E27FC236}">
+                <a16:creationId xmlns:a16="http://schemas.microsoft.com/office/drawing/2014/main" id="{F827399D-EC17-430C-BBC7-39C2F4EA5716}"/>
+              </a:ext>
+            </a:extLst>
+          </p:cNvPr>
+          <p:cNvPicPr>
+            <a:picLocks noChangeAspect="1"/>
+          </p:cNvPicPr>
+          <p:nvPr/>
+        </p:nvPicPr>
+        <p:blipFill>
+          <a:blip r:embed="rId6"/>
+          <a:stretch>
+            <a:fillRect/>
+          </a:stretch>
+        </p:blipFill>
+        <p:spPr>
+          <a:xfrm>
+            <a:off x="1838857" y="1795450"/>
+            <a:ext cx="7761905" cy="3980952"/>
+          </a:xfrm>
+          <a:prstGeom prst="rect">
+            <a:avLst/>
+          </a:prstGeom>
+        </p:spPr>
+      </p:pic>
     </p:spTree>
     <p:extLst>
       <p:ext uri="{BB962C8B-B14F-4D97-AF65-F5344CB8AC3E}">
-        <p14:creationId xmlns:p14="http://schemas.microsoft.com/office/powerpoint/2010/main" val="3187741617"/>
+        <p14:creationId xmlns:p14="http://schemas.microsoft.com/office/powerpoint/2010/main" val="3683391040"/>
       </p:ext>
     </p:extLst>
   </p:cSld>
   <p:clrMapOvr>
     <a:masterClrMapping/>
   </p:clrMapOvr>
+  <p:timing>
+    <p:tnLst>
+      <p:par>
+        <p:cTn id="1" dur="indefinite" restart="never" nodeType="tmRoot">
+          <p:childTnLst>
+            <p:seq concurrent="1" nextAc="seek">
+              <p:cTn id="2" dur="indefinite" nodeType="mainSeq">
+                <p:childTnLst>
+                  <p:par>
+                    <p:cTn id="3" fill="hold">
+                      <p:stCondLst>
+                        <p:cond delay="indefinite"/>
+                      </p:stCondLst>
+                      <p:childTnLst>
+                        <p:par>
+                          <p:cTn id="4" fill="hold">
+                            <p:stCondLst>
+                              <p:cond delay="0"/>
+                            </p:stCondLst>
+                            <p:childTnLst>
+                              <p:par>
+                                <p:cTn id="5" presetID="10" presetClass="entr" presetSubtype="0" fill="hold" nodeType="clickEffect">
+                                  <p:stCondLst>
+                                    <p:cond delay="0"/>
+                                  </p:stCondLst>
+                                  <p:childTnLst>
+                                    <p:set>
+                                      <p:cBhvr>
+                                        <p:cTn id="6" dur="1" fill="hold">
+                                          <p:stCondLst>
+                                            <p:cond delay="0"/>
+                                          </p:stCondLst>
+                                        </p:cTn>
+                                        <p:tgtEl>
+                                          <p:spTgt spid="4"/>
+                                        </p:tgtEl>
+                                        <p:attrNameLst>
+                                          <p:attrName>style.visibility</p:attrName>
+                                        </p:attrNameLst>
+                                      </p:cBhvr>
+                                      <p:to>
+                                        <p:strVal val="visible"/>
+                                      </p:to>
+                                    </p:set>
+                                    <p:animEffect transition="in" filter="fade">
+                                      <p:cBhvr>
+                                        <p:cTn id="7" dur="500"/>
+                                        <p:tgtEl>
+                                          <p:spTgt spid="4"/>
+                                        </p:tgtEl>
+                                      </p:cBhvr>
+                                    </p:animEffect>
+                                  </p:childTnLst>
+                                </p:cTn>
+                              </p:par>
+                            </p:childTnLst>
+                          </p:cTn>
+                        </p:par>
+                      </p:childTnLst>
+                    </p:cTn>
+                  </p:par>
+                  <p:par>
+                    <p:cTn id="8" fill="hold">
+                      <p:stCondLst>
+                        <p:cond delay="indefinite"/>
+                      </p:stCondLst>
+                      <p:childTnLst>
+                        <p:par>
+                          <p:cTn id="9" fill="hold">
+                            <p:stCondLst>
+                              <p:cond delay="0"/>
+                            </p:stCondLst>
+                            <p:childTnLst>
+                              <p:par>
+                                <p:cTn id="10" presetID="10" presetClass="entr" presetSubtype="0" fill="hold" nodeType="clickEffect">
+                                  <p:stCondLst>
+                                    <p:cond delay="0"/>
+                                  </p:stCondLst>
+                                  <p:childTnLst>
+                                    <p:set>
+                                      <p:cBhvr>
+                                        <p:cTn id="11" dur="1" fill="hold">
+                                          <p:stCondLst>
+                                            <p:cond delay="0"/>
+                                          </p:stCondLst>
+                                        </p:cTn>
+                                        <p:tgtEl>
+                                          <p:spTgt spid="5"/>
+                                        </p:tgtEl>
+                                        <p:attrNameLst>
+                                          <p:attrName>style.visibility</p:attrName>
+                                        </p:attrNameLst>
+                                      </p:cBhvr>
+                                      <p:to>
+                                        <p:strVal val="visible"/>
+                                      </p:to>
+                                    </p:set>
+                                    <p:animEffect transition="in" filter="fade">
+                                      <p:cBhvr>
+                                        <p:cTn id="12" dur="500"/>
+                                        <p:tgtEl>
+                                          <p:spTgt spid="5"/>
+                                        </p:tgtEl>
+                                      </p:cBhvr>
+                                    </p:animEffect>
+                                  </p:childTnLst>
+                                </p:cTn>
+                              </p:par>
+                            </p:childTnLst>
+                          </p:cTn>
+                        </p:par>
+                      </p:childTnLst>
+                    </p:cTn>
+                  </p:par>
+                  <p:par>
+                    <p:cTn id="13" fill="hold">
+                      <p:stCondLst>
+                        <p:cond delay="indefinite"/>
+                      </p:stCondLst>
+                      <p:childTnLst>
+                        <p:par>
+                          <p:cTn id="14" fill="hold">
+                            <p:stCondLst>
+                              <p:cond delay="0"/>
+                            </p:stCondLst>
+                            <p:childTnLst>
+                              <p:par>
+                                <p:cTn id="15" presetID="10" presetClass="entr" presetSubtype="0" fill="hold" nodeType="clickEffect">
+                                  <p:stCondLst>
+                                    <p:cond delay="0"/>
+                                  </p:stCondLst>
+                                  <p:childTnLst>
+                                    <p:set>
+                                      <p:cBhvr>
+                                        <p:cTn id="16" dur="1" fill="hold">
+                                          <p:stCondLst>
+                                            <p:cond delay="0"/>
+                                          </p:stCondLst>
+                                        </p:cTn>
+                                        <p:tgtEl>
+                                          <p:spTgt spid="6"/>
+                                        </p:tgtEl>
+                                        <p:attrNameLst>
+                                          <p:attrName>style.visibility</p:attrName>
+                                        </p:attrNameLst>
+                                      </p:cBhvr>
+                                      <p:to>
+                                        <p:strVal val="visible"/>
+                                      </p:to>
+                                    </p:set>
+                                    <p:animEffect transition="in" filter="fade">
+                                      <p:cBhvr>
+                                        <p:cTn id="17" dur="500"/>
+                                        <p:tgtEl>
+                                          <p:spTgt spid="6"/>
+                                        </p:tgtEl>
+                                      </p:cBhvr>
+                                    </p:animEffect>
+                                  </p:childTnLst>
+                                </p:cTn>
+                              </p:par>
+                            </p:childTnLst>
+                          </p:cTn>
+                        </p:par>
+                      </p:childTnLst>
+                    </p:cTn>
+                  </p:par>
+                  <p:par>
+                    <p:cTn id="18" fill="hold">
+                      <p:stCondLst>
+                        <p:cond delay="indefinite"/>
+                      </p:stCondLst>
+                      <p:childTnLst>
+                        <p:par>
+                          <p:cTn id="19" fill="hold">
+                            <p:stCondLst>
+                              <p:cond delay="0"/>
+                            </p:stCondLst>
+                            <p:childTnLst>
+                              <p:par>
+                                <p:cTn id="20" presetID="10" presetClass="entr" presetSubtype="0" fill="hold" nodeType="clickEffect">
+                                  <p:stCondLst>
+                                    <p:cond delay="0"/>
+                                  </p:stCondLst>
+                                  <p:childTnLst>
+                                    <p:set>
+                                      <p:cBhvr>
+                                        <p:cTn id="21" dur="1" fill="hold">
+                                          <p:stCondLst>
+                                            <p:cond delay="0"/>
+                                          </p:stCondLst>
+                                        </p:cTn>
+                                        <p:tgtEl>
+                                          <p:spTgt spid="7"/>
+                                        </p:tgtEl>
+                                        <p:attrNameLst>
+                                          <p:attrName>style.visibility</p:attrName>
+                                        </p:attrNameLst>
+                                      </p:cBhvr>
+                                      <p:to>
+                                        <p:strVal val="visible"/>
+                                      </p:to>
+                                    </p:set>
+                                    <p:animEffect transition="in" filter="fade">
+                                      <p:cBhvr>
+                                        <p:cTn id="22" dur="500"/>
+                                        <p:tgtEl>
+                                          <p:spTgt spid="7"/>
+                                        </p:tgtEl>
+                                      </p:cBhvr>
+                                    </p:animEffect>
+                                  </p:childTnLst>
+                                </p:cTn>
+                              </p:par>
+                            </p:childTnLst>
+                          </p:cTn>
+                        </p:par>
+                      </p:childTnLst>
+                    </p:cTn>
+                  </p:par>
+                  <p:par>
+                    <p:cTn id="23" fill="hold">
+                      <p:stCondLst>
+                        <p:cond delay="indefinite"/>
+                      </p:stCondLst>
+                      <p:childTnLst>
+                        <p:par>
+                          <p:cTn id="24" fill="hold">
+                            <p:stCondLst>
+                              <p:cond delay="0"/>
+                            </p:stCondLst>
+                            <p:childTnLst>
+                              <p:par>
+                                <p:cTn id="25" presetID="10" presetClass="entr" presetSubtype="0" fill="hold" nodeType="clickEffect">
+                                  <p:stCondLst>
+                                    <p:cond delay="0"/>
+                                  </p:stCondLst>
+                                  <p:childTnLst>
+                                    <p:set>
+                                      <p:cBhvr>
+                                        <p:cTn id="26" dur="1" fill="hold">
+                                          <p:stCondLst>
+                                            <p:cond delay="0"/>
+                                          </p:stCondLst>
+                                        </p:cTn>
+                                        <p:tgtEl>
+                                          <p:spTgt spid="8"/>
+                                        </p:tgtEl>
+                                        <p:attrNameLst>
+                                          <p:attrName>style.visibility</p:attrName>
+                                        </p:attrNameLst>
+                                      </p:cBhvr>
+                                      <p:to>
+                                        <p:strVal val="visible"/>
+                                      </p:to>
+                                    </p:set>
+                                    <p:animEffect transition="in" filter="fade">
+                                      <p:cBhvr>
+                                        <p:cTn id="27" dur="500"/>
+                                        <p:tgtEl>
+                                          <p:spTgt spid="8"/>
+                                        </p:tgtEl>
+                                      </p:cBhvr>
+                                    </p:animEffect>
+                                  </p:childTnLst>
+                                </p:cTn>
+                              </p:par>
+                            </p:childTnLst>
+                          </p:cTn>
+                        </p:par>
+                      </p:childTnLst>
+                    </p:cTn>
+                  </p:par>
+                </p:childTnLst>
+              </p:cTn>
+              <p:prevCondLst>
+                <p:cond evt="onPrev" delay="0">
+                  <p:tgtEl>
+                    <p:sldTgt/>
+                  </p:tgtEl>
+                </p:cond>
+              </p:prevCondLst>
+              <p:nextCondLst>
+                <p:cond evt="onNext" delay="0">
+                  <p:tgtEl>
+                    <p:sldTgt/>
+                  </p:tgtEl>
+                </p:cond>
+              </p:nextCondLst>
+            </p:seq>
+          </p:childTnLst>
+        </p:cTn>
+      </p:par>
+    </p:tnLst>
+  </p:timing>
 </p:sld>
 </file>
 
@@ -4486,7 +5422,7 @@
           <a:p>
             <a:r>
               <a:rPr lang="zh-CN" altLang="en-US" dirty="0"/>
-              <a:t>一、区块链应用历史及背景</a:t>
+              <a:t>一、区块链历史背景</a:t>
             </a:r>
             <a:endParaRPr lang="en-US" altLang="zh-CN" dirty="0"/>
           </a:p>
@@ -4508,7 +5444,7 @@
           <a:p>
             <a:r>
               <a:rPr lang="zh-CN" altLang="en-US" dirty="0"/>
-              <a:t>三、智能合约介绍</a:t>
+              <a:t>三、智能合约</a:t>
             </a:r>
           </a:p>
         </p:txBody>
@@ -4566,58 +5502,40 @@
           <a:p>
             <a:r>
               <a:rPr lang="zh-CN" altLang="en-US" dirty="0"/>
-              <a:t>挖矿过程，计算</a:t>
-            </a:r>
-            <a:r>
-              <a:rPr lang="en-US" altLang="zh-CN" dirty="0"/>
-              <a:t>hash</a:t>
-            </a:r>
-            <a:r>
-              <a:rPr lang="zh-CN" altLang="en-US" dirty="0"/>
-              <a:t>值</a:t>
-            </a:r>
-          </a:p>
-        </p:txBody>
-      </p:sp>
-      <p:pic>
-        <p:nvPicPr>
-          <p:cNvPr id="5" name="内容占位符 4">
-            <a:extLst>
-              <a:ext uri="{FF2B5EF4-FFF2-40B4-BE49-F238E27FC236}">
-                <a16:creationId xmlns:a16="http://schemas.microsoft.com/office/drawing/2014/main" id="{F354A075-297F-46E4-99E8-349BC280082C}"/>
-              </a:ext>
-            </a:extLst>
-          </p:cNvPr>
-          <p:cNvPicPr>
-            <a:picLocks noGrp="1" noChangeAspect="1"/>
-          </p:cNvPicPr>
+              <a:t>三、智能合约介绍</a:t>
+            </a:r>
+          </a:p>
+        </p:txBody>
+      </p:sp>
+      <p:sp>
+        <p:nvSpPr>
+          <p:cNvPr id="3" name="内容占位符 2">
+            <a:extLst>
+              <a:ext uri="{FF2B5EF4-FFF2-40B4-BE49-F238E27FC236}">
+                <a16:creationId xmlns:a16="http://schemas.microsoft.com/office/drawing/2014/main" id="{E3889C37-D9E9-402C-8972-A060ED855CAA}"/>
+              </a:ext>
+            </a:extLst>
+          </p:cNvPr>
+          <p:cNvSpPr>
+            <a:spLocks noGrp="1"/>
+          </p:cNvSpPr>
           <p:nvPr>
             <p:ph idx="1"/>
           </p:nvPr>
-        </p:nvPicPr>
-        <p:blipFill>
-          <a:blip r:embed="rId2">
-            <a:extLst>
-              <a:ext uri="{28A0092B-C50C-407E-A947-70E740481C1C}">
-                <a14:useLocalDpi xmlns:a14="http://schemas.microsoft.com/office/drawing/2010/main" val="0"/>
-              </a:ext>
-            </a:extLst>
-          </a:blip>
-          <a:stretch>
-            <a:fillRect/>
-          </a:stretch>
-        </p:blipFill>
-        <p:spPr>
-          <a:xfrm>
-            <a:off x="1358281" y="1246257"/>
-            <a:ext cx="8160813" cy="4763926"/>
-          </a:xfrm>
-        </p:spPr>
-      </p:pic>
+        </p:nvSpPr>
+        <p:spPr/>
+        <p:txBody>
+          <a:bodyPr/>
+          <a:lstStyle/>
+          <a:p>
+            <a:endParaRPr lang="zh-CN" altLang="en-US" dirty="0"/>
+          </a:p>
+        </p:txBody>
+      </p:sp>
     </p:spTree>
     <p:extLst>
       <p:ext uri="{BB962C8B-B14F-4D97-AF65-F5344CB8AC3E}">
-        <p14:creationId xmlns:p14="http://schemas.microsoft.com/office/powerpoint/2010/main" val="766144630"/>
+        <p14:creationId xmlns:p14="http://schemas.microsoft.com/office/powerpoint/2010/main" val="3877100491"/>
       </p:ext>
     </p:extLst>
   </p:cSld>
@@ -4649,7 +5567,7 @@
           <p:cNvPr id="2" name="标题 1">
             <a:extLst>
               <a:ext uri="{FF2B5EF4-FFF2-40B4-BE49-F238E27FC236}">
-                <a16:creationId xmlns:a16="http://schemas.microsoft.com/office/drawing/2014/main" id="{8B515EE1-3137-4D91-AE7E-79CF1EA90689}"/>
+                <a16:creationId xmlns:a16="http://schemas.microsoft.com/office/drawing/2014/main" id="{A410D57B-116E-442A-9C80-2637AF9F868D}"/>
               </a:ext>
             </a:extLst>
           </p:cNvPr>
@@ -4667,15 +5585,7 @@
           <a:p>
             <a:r>
               <a:rPr lang="zh-CN" altLang="en-US" dirty="0"/>
-              <a:t>为何这样设计。如</a:t>
-            </a:r>
-            <a:r>
-              <a:rPr lang="en-US" altLang="zh-CN" dirty="0"/>
-              <a:t>51%</a:t>
-            </a:r>
-            <a:r>
-              <a:rPr lang="zh-CN" altLang="en-US"/>
-              <a:t>算力攻击，挖矿与价格的波动等</a:t>
+              <a:t>去中心化</a:t>
             </a:r>
           </a:p>
         </p:txBody>
@@ -4685,7 +5595,7 @@
           <p:cNvPr id="3" name="内容占位符 2">
             <a:extLst>
               <a:ext uri="{FF2B5EF4-FFF2-40B4-BE49-F238E27FC236}">
-                <a16:creationId xmlns:a16="http://schemas.microsoft.com/office/drawing/2014/main" id="{EBE4EB7E-2610-487F-92DE-A3C26B45637A}"/>
+                <a16:creationId xmlns:a16="http://schemas.microsoft.com/office/drawing/2014/main" id="{AA4965EB-C7C2-4891-A98B-57D906F4EEDD}"/>
               </a:ext>
             </a:extLst>
           </p:cNvPr>
@@ -4701,14 +5611,37 @@
           <a:bodyPr/>
           <a:lstStyle/>
           <a:p>
-            <a:endParaRPr lang="zh-CN" altLang="en-US"/>
+            <a:r>
+              <a:rPr lang="zh-CN" altLang="en-US" dirty="0"/>
+              <a:t>没有强中心控制。无某一节点占有资源得到系统控制权，整体意识由下而上。</a:t>
+            </a:r>
+            <a:endParaRPr lang="en-US" altLang="zh-CN" dirty="0"/>
+          </a:p>
+          <a:p>
+            <a:endParaRPr lang="en-US" altLang="zh-CN" dirty="0"/>
+          </a:p>
+          <a:p>
+            <a:r>
+              <a:rPr lang="zh-CN" altLang="en-US" dirty="0"/>
+              <a:t>节点自治。通过自治和协作构成整体</a:t>
+            </a:r>
+            <a:endParaRPr lang="en-US" altLang="zh-CN" dirty="0"/>
+          </a:p>
+          <a:p>
+            <a:endParaRPr lang="en-US" altLang="zh-CN" dirty="0"/>
+          </a:p>
+          <a:p>
+            <a:r>
+              <a:rPr lang="zh-CN" altLang="en-US" dirty="0"/>
+              <a:t>高度连接。任意节点间可以连接、互信</a:t>
+            </a:r>
           </a:p>
         </p:txBody>
       </p:sp>
     </p:spTree>
     <p:extLst>
       <p:ext uri="{BB962C8B-B14F-4D97-AF65-F5344CB8AC3E}">
-        <p14:creationId xmlns:p14="http://schemas.microsoft.com/office/powerpoint/2010/main" val="3683391040"/>
+        <p14:creationId xmlns:p14="http://schemas.microsoft.com/office/powerpoint/2010/main" val="2849388880"/>
       </p:ext>
     </p:extLst>
   </p:cSld>
@@ -4740,7 +5673,7 @@
           <p:cNvPr id="2" name="标题 1">
             <a:extLst>
               <a:ext uri="{FF2B5EF4-FFF2-40B4-BE49-F238E27FC236}">
-                <a16:creationId xmlns:a16="http://schemas.microsoft.com/office/drawing/2014/main" id="{F56C36F9-4535-486E-B0A9-5A9793F7649C}"/>
+                <a16:creationId xmlns:a16="http://schemas.microsoft.com/office/drawing/2014/main" id="{4D2116B4-C02F-4EEF-9F6E-390C44A31281}"/>
               </a:ext>
             </a:extLst>
           </p:cNvPr>
@@ -4756,10 +5689,7 @@
           <a:bodyPr/>
           <a:lstStyle/>
           <a:p>
-            <a:r>
-              <a:rPr lang="zh-CN" altLang="en-US" dirty="0"/>
-              <a:t>小结</a:t>
-            </a:r>
+            <a:endParaRPr lang="zh-CN" altLang="en-US"/>
           </a:p>
         </p:txBody>
       </p:sp>
@@ -4768,7 +5698,7 @@
           <p:cNvPr id="3" name="内容占位符 2">
             <a:extLst>
               <a:ext uri="{FF2B5EF4-FFF2-40B4-BE49-F238E27FC236}">
-                <a16:creationId xmlns:a16="http://schemas.microsoft.com/office/drawing/2014/main" id="{E3889C37-D9E9-402C-8972-A060ED855CAA}"/>
+                <a16:creationId xmlns:a16="http://schemas.microsoft.com/office/drawing/2014/main" id="{5ED81973-427A-472B-AD6A-945E6CB331C1}"/>
               </a:ext>
             </a:extLst>
           </p:cNvPr>
@@ -4784,35 +5714,44 @@
           <a:bodyPr/>
           <a:lstStyle/>
           <a:p>
-            <a:r>
-              <a:rPr lang="zh-CN" altLang="en-US" dirty="0"/>
-              <a:t>共识机制</a:t>
-            </a:r>
-            <a:endParaRPr lang="en-US" altLang="zh-CN" dirty="0"/>
-          </a:p>
-          <a:p>
-            <a:r>
-              <a:rPr lang="zh-CN" altLang="en-US" dirty="0"/>
-              <a:t>一致性，分叉处理</a:t>
-            </a:r>
-            <a:endParaRPr lang="en-US" altLang="zh-CN" dirty="0"/>
-          </a:p>
-          <a:p>
-            <a:r>
-              <a:rPr lang="en-US" altLang="zh-CN" dirty="0"/>
-              <a:t>SPV</a:t>
-            </a:r>
-            <a:r>
-              <a:rPr lang="zh-CN" altLang="en-US" dirty="0"/>
-              <a:t>说明 </a:t>
-            </a:r>
-          </a:p>
-        </p:txBody>
-      </p:sp>
+            <a:endParaRPr lang="zh-CN" altLang="en-US"/>
+          </a:p>
+        </p:txBody>
+      </p:sp>
+      <p:pic>
+        <p:nvPicPr>
+          <p:cNvPr id="4" name="图片 3">
+            <a:extLst>
+              <a:ext uri="{FF2B5EF4-FFF2-40B4-BE49-F238E27FC236}">
+                <a16:creationId xmlns:a16="http://schemas.microsoft.com/office/drawing/2014/main" id="{A31B37EA-FE2B-41B8-82D4-C57642591EAD}"/>
+              </a:ext>
+            </a:extLst>
+          </p:cNvPr>
+          <p:cNvPicPr>
+            <a:picLocks noChangeAspect="1"/>
+          </p:cNvPicPr>
+          <p:nvPr/>
+        </p:nvPicPr>
+        <p:blipFill>
+          <a:blip r:embed="rId2"/>
+          <a:stretch>
+            <a:fillRect/>
+          </a:stretch>
+        </p:blipFill>
+        <p:spPr>
+          <a:xfrm>
+            <a:off x="1515861" y="1573698"/>
+            <a:ext cx="8876190" cy="4314286"/>
+          </a:xfrm>
+          <a:prstGeom prst="rect">
+            <a:avLst/>
+          </a:prstGeom>
+        </p:spPr>
+      </p:pic>
     </p:spTree>
     <p:extLst>
       <p:ext uri="{BB962C8B-B14F-4D97-AF65-F5344CB8AC3E}">
-        <p14:creationId xmlns:p14="http://schemas.microsoft.com/office/powerpoint/2010/main" val="2173577567"/>
+        <p14:creationId xmlns:p14="http://schemas.microsoft.com/office/powerpoint/2010/main" val="126572771"/>
       </p:ext>
     </p:extLst>
   </p:cSld>
@@ -4841,60 +5780,169 @@
       </p:grpSpPr>
       <p:sp>
         <p:nvSpPr>
-          <p:cNvPr id="2" name="标题 1">
-            <a:extLst>
-              <a:ext uri="{FF2B5EF4-FFF2-40B4-BE49-F238E27FC236}">
-                <a16:creationId xmlns:a16="http://schemas.microsoft.com/office/drawing/2014/main" id="{1112907B-032A-40C9-BF5B-03A22123C40C}"/>
-              </a:ext>
-            </a:extLst>
-          </p:cNvPr>
-          <p:cNvSpPr>
-            <a:spLocks noGrp="1"/>
-          </p:cNvSpPr>
-          <p:nvPr>
-            <p:ph type="title"/>
-          </p:nvPr>
-        </p:nvSpPr>
-        <p:spPr/>
+          <p:cNvPr id="3" name="内容占位符 2">
+            <a:extLst>
+              <a:ext uri="{FF2B5EF4-FFF2-40B4-BE49-F238E27FC236}">
+                <a16:creationId xmlns:a16="http://schemas.microsoft.com/office/drawing/2014/main" id="{86A5D1C4-A8EF-47B6-9111-A347AB0D70D1}"/>
+              </a:ext>
+            </a:extLst>
+          </p:cNvPr>
+          <p:cNvSpPr>
+            <a:spLocks noGrp="1"/>
+          </p:cNvSpPr>
+          <p:nvPr>
+            <p:ph idx="1"/>
+          </p:nvPr>
+        </p:nvSpPr>
+        <p:spPr>
+          <a:xfrm>
+            <a:off x="838200" y="932155"/>
+            <a:ext cx="10515600" cy="5244808"/>
+          </a:xfrm>
+        </p:spPr>
         <p:txBody>
           <a:bodyPr/>
           <a:lstStyle/>
           <a:p>
             <a:r>
               <a:rPr lang="zh-CN" altLang="en-US" b="1" dirty="0"/>
-              <a:t>共识机制</a:t>
-            </a:r>
-            <a:br>
-              <a:rPr lang="zh-CN" altLang="en-US" b="1" dirty="0"/>
-            </a:br>
+              <a:t>以太坊</a:t>
+            </a:r>
+            <a:r>
+              <a:rPr lang="zh-CN" altLang="en-US" dirty="0"/>
+              <a:t>（英语：</a:t>
+            </a:r>
+            <a:r>
+              <a:rPr lang="en-US" altLang="zh-CN" dirty="0"/>
+              <a:t>Ethereum</a:t>
+            </a:r>
+            <a:r>
+              <a:rPr lang="zh-CN" altLang="en-US" dirty="0"/>
+              <a:t>）是一个</a:t>
+            </a:r>
+            <a:r>
+              <a:rPr lang="zh-CN" altLang="en-US" dirty="0">
+                <a:hlinkClick r:id="rId2" tooltip="开源"/>
+              </a:rPr>
+              <a:t>开源</a:t>
+            </a:r>
+            <a:r>
+              <a:rPr lang="zh-CN" altLang="en-US" dirty="0"/>
+              <a:t>的有</a:t>
+            </a:r>
+            <a:r>
+              <a:rPr lang="zh-CN" altLang="en-US" dirty="0">
+                <a:hlinkClick r:id="rId3"/>
+              </a:rPr>
+              <a:t>智能合约</a:t>
+            </a:r>
+            <a:r>
+              <a:rPr lang="zh-CN" altLang="en-US" dirty="0"/>
+              <a:t>功能的公共</a:t>
+            </a:r>
+            <a:r>
+              <a:rPr lang="zh-CN" altLang="en-US" dirty="0">
+                <a:hlinkClick r:id="rId4" tooltip="区块链"/>
+              </a:rPr>
+              <a:t>区块链</a:t>
+            </a:r>
+            <a:r>
+              <a:rPr lang="zh-CN" altLang="en-US" dirty="0"/>
+              <a:t>平台，提供</a:t>
+            </a:r>
+            <a:r>
+              <a:rPr lang="zh-CN" altLang="en-US" dirty="0">
+                <a:hlinkClick r:id="rId5" tooltip="去中心化"/>
+              </a:rPr>
+              <a:t>去中心化</a:t>
+            </a:r>
+            <a:r>
+              <a:rPr lang="zh-CN" altLang="en-US" dirty="0"/>
+              <a:t>的</a:t>
+            </a:r>
+            <a:r>
+              <a:rPr lang="zh-CN" altLang="en-US" dirty="0">
+                <a:hlinkClick r:id="rId6" tooltip="虚拟机"/>
+              </a:rPr>
+              <a:t>虚拟机</a:t>
+            </a:r>
+            <a:r>
+              <a:rPr lang="zh-CN" altLang="en-US" dirty="0"/>
+              <a:t>来处理</a:t>
+            </a:r>
+            <a:r>
+              <a:rPr lang="zh-CN" altLang="en-US" dirty="0">
+                <a:hlinkClick r:id="rId7" tooltip="点对点"/>
+              </a:rPr>
+              <a:t>点对点</a:t>
+            </a:r>
+            <a:r>
+              <a:rPr lang="zh-CN" altLang="en-US" dirty="0"/>
+              <a:t>合约。</a:t>
+            </a:r>
+            <a:endParaRPr lang="en-US" altLang="zh-CN" dirty="0"/>
+          </a:p>
+          <a:p>
+            <a:endParaRPr lang="en-US" altLang="zh-CN" dirty="0"/>
+          </a:p>
+          <a:p>
             <a:endParaRPr lang="zh-CN" altLang="en-US" dirty="0"/>
           </a:p>
-        </p:txBody>
-      </p:sp>
-      <p:sp>
-        <p:nvSpPr>
-          <p:cNvPr id="3" name="内容占位符 2">
-            <a:extLst>
-              <a:ext uri="{FF2B5EF4-FFF2-40B4-BE49-F238E27FC236}">
-                <a16:creationId xmlns:a16="http://schemas.microsoft.com/office/drawing/2014/main" id="{F82C187E-E022-442C-96FD-F26721195A7B}"/>
-              </a:ext>
-            </a:extLst>
-          </p:cNvPr>
-          <p:cNvSpPr>
-            <a:spLocks noGrp="1"/>
-          </p:cNvSpPr>
-          <p:nvPr>
-            <p:ph idx="1"/>
-          </p:nvPr>
-        </p:nvSpPr>
-        <p:spPr/>
-        <p:txBody>
-          <a:bodyPr/>
-          <a:lstStyle/>
-          <a:p>
-            <a:r>
-              <a:rPr lang="zh-CN" altLang="en-US" b="1" dirty="0"/>
-              <a:t>负反馈调节</a:t>
+          <a:p>
+            <a:r>
+              <a:rPr lang="en-US" altLang="zh-CN" dirty="0"/>
+              <a:t>Linux </a:t>
+            </a:r>
+            <a:r>
+              <a:rPr lang="zh-CN" altLang="en-US" dirty="0"/>
+              <a:t>基金会</a:t>
+            </a:r>
+            <a:r>
+              <a:rPr lang="en-US" altLang="zh-CN" dirty="0" err="1"/>
+              <a:t>Hyperledge</a:t>
+            </a:r>
+            <a:endParaRPr lang="en-US" altLang="zh-CN" dirty="0"/>
+          </a:p>
+          <a:p>
+            <a:r>
+              <a:rPr lang="en-US" altLang="zh-CN" dirty="0"/>
+              <a:t>NEO</a:t>
+            </a:r>
+            <a:r>
+              <a:rPr lang="zh-CN" altLang="en-US" dirty="0"/>
+              <a:t>（小蚁）</a:t>
+            </a:r>
+            <a:endParaRPr lang="en-US" altLang="zh-CN" dirty="0"/>
+          </a:p>
+          <a:p>
+            <a:r>
+              <a:rPr lang="en-US" altLang="zh-CN" dirty="0"/>
+              <a:t>EOS</a:t>
+            </a:r>
+          </a:p>
+          <a:p>
+            <a:r>
+              <a:rPr lang="zh-CN" altLang="en-US" dirty="0"/>
+              <a:t> </a:t>
+            </a:r>
+            <a:r>
+              <a:rPr lang="en-US" altLang="zh-CN" dirty="0"/>
+              <a:t>IPFS</a:t>
+            </a:r>
+            <a:r>
+              <a:rPr lang="zh-CN" altLang="en-US" dirty="0"/>
+              <a:t> </a:t>
+            </a:r>
+            <a:r>
+              <a:rPr lang="en-US" altLang="zh-CN" dirty="0" err="1"/>
+              <a:t>filecoin</a:t>
+            </a:r>
+            <a:endParaRPr lang="en-US" altLang="zh-CN" dirty="0"/>
+          </a:p>
+          <a:p>
+            <a:r>
+              <a:rPr lang="en-US" altLang="zh-CN" dirty="0"/>
+              <a:t>IOTA</a:t>
             </a:r>
           </a:p>
           <a:p>
@@ -4905,13 +5953,337 @@
     </p:spTree>
     <p:extLst>
       <p:ext uri="{BB962C8B-B14F-4D97-AF65-F5344CB8AC3E}">
-        <p14:creationId xmlns:p14="http://schemas.microsoft.com/office/powerpoint/2010/main" val="3657856825"/>
+        <p14:creationId xmlns:p14="http://schemas.microsoft.com/office/powerpoint/2010/main" val="1406179623"/>
       </p:ext>
     </p:extLst>
   </p:cSld>
   <p:clrMapOvr>
     <a:masterClrMapping/>
   </p:clrMapOvr>
+  <p:timing>
+    <p:tnLst>
+      <p:par>
+        <p:cTn id="1" dur="indefinite" restart="never" nodeType="tmRoot">
+          <p:childTnLst>
+            <p:seq concurrent="1" nextAc="seek">
+              <p:cTn id="2" dur="indefinite" nodeType="mainSeq">
+                <p:childTnLst>
+                  <p:par>
+                    <p:cTn id="3" fill="hold">
+                      <p:stCondLst>
+                        <p:cond delay="indefinite"/>
+                      </p:stCondLst>
+                      <p:childTnLst>
+                        <p:par>
+                          <p:cTn id="4" fill="hold">
+                            <p:stCondLst>
+                              <p:cond delay="0"/>
+                            </p:stCondLst>
+                            <p:childTnLst>
+                              <p:par>
+                                <p:cTn id="5" presetID="10" presetClass="entr" presetSubtype="0" fill="hold" nodeType="clickEffect">
+                                  <p:stCondLst>
+                                    <p:cond delay="0"/>
+                                  </p:stCondLst>
+                                  <p:childTnLst>
+                                    <p:set>
+                                      <p:cBhvr>
+                                        <p:cTn id="6" dur="1" fill="hold">
+                                          <p:stCondLst>
+                                            <p:cond delay="0"/>
+                                          </p:stCondLst>
+                                        </p:cTn>
+                                        <p:tgtEl>
+                                          <p:spTgt spid="3">
+                                            <p:txEl>
+                                              <p:pRg st="0" end="0"/>
+                                            </p:txEl>
+                                          </p:spTgt>
+                                        </p:tgtEl>
+                                        <p:attrNameLst>
+                                          <p:attrName>style.visibility</p:attrName>
+                                        </p:attrNameLst>
+                                      </p:cBhvr>
+                                      <p:to>
+                                        <p:strVal val="visible"/>
+                                      </p:to>
+                                    </p:set>
+                                    <p:animEffect transition="in" filter="fade">
+                                      <p:cBhvr>
+                                        <p:cTn id="7" dur="500"/>
+                                        <p:tgtEl>
+                                          <p:spTgt spid="3">
+                                            <p:txEl>
+                                              <p:pRg st="0" end="0"/>
+                                            </p:txEl>
+                                          </p:spTgt>
+                                        </p:tgtEl>
+                                      </p:cBhvr>
+                                    </p:animEffect>
+                                  </p:childTnLst>
+                                </p:cTn>
+                              </p:par>
+                            </p:childTnLst>
+                          </p:cTn>
+                        </p:par>
+                      </p:childTnLst>
+                    </p:cTn>
+                  </p:par>
+                  <p:par>
+                    <p:cTn id="8" fill="hold">
+                      <p:stCondLst>
+                        <p:cond delay="indefinite"/>
+                      </p:stCondLst>
+                      <p:childTnLst>
+                        <p:par>
+                          <p:cTn id="9" fill="hold">
+                            <p:stCondLst>
+                              <p:cond delay="0"/>
+                            </p:stCondLst>
+                            <p:childTnLst>
+                              <p:par>
+                                <p:cTn id="10" presetID="10" presetClass="entr" presetSubtype="0" fill="hold" nodeType="clickEffect">
+                                  <p:stCondLst>
+                                    <p:cond delay="0"/>
+                                  </p:stCondLst>
+                                  <p:childTnLst>
+                                    <p:set>
+                                      <p:cBhvr>
+                                        <p:cTn id="11" dur="1" fill="hold">
+                                          <p:stCondLst>
+                                            <p:cond delay="0"/>
+                                          </p:stCondLst>
+                                        </p:cTn>
+                                        <p:tgtEl>
+                                          <p:spTgt spid="3">
+                                            <p:txEl>
+                                              <p:pRg st="3" end="3"/>
+                                            </p:txEl>
+                                          </p:spTgt>
+                                        </p:tgtEl>
+                                        <p:attrNameLst>
+                                          <p:attrName>style.visibility</p:attrName>
+                                        </p:attrNameLst>
+                                      </p:cBhvr>
+                                      <p:to>
+                                        <p:strVal val="visible"/>
+                                      </p:to>
+                                    </p:set>
+                                    <p:animEffect transition="in" filter="fade">
+                                      <p:cBhvr>
+                                        <p:cTn id="12" dur="500"/>
+                                        <p:tgtEl>
+                                          <p:spTgt spid="3">
+                                            <p:txEl>
+                                              <p:pRg st="3" end="3"/>
+                                            </p:txEl>
+                                          </p:spTgt>
+                                        </p:tgtEl>
+                                      </p:cBhvr>
+                                    </p:animEffect>
+                                  </p:childTnLst>
+                                </p:cTn>
+                              </p:par>
+                              <p:par>
+                                <p:cTn id="13" presetID="10" presetClass="entr" presetSubtype="0" fill="hold" nodeType="withEffect">
+                                  <p:stCondLst>
+                                    <p:cond delay="0"/>
+                                  </p:stCondLst>
+                                  <p:childTnLst>
+                                    <p:set>
+                                      <p:cBhvr>
+                                        <p:cTn id="14" dur="1" fill="hold">
+                                          <p:stCondLst>
+                                            <p:cond delay="0"/>
+                                          </p:stCondLst>
+                                        </p:cTn>
+                                        <p:tgtEl>
+                                          <p:spTgt spid="3">
+                                            <p:txEl>
+                                              <p:pRg st="4" end="4"/>
+                                            </p:txEl>
+                                          </p:spTgt>
+                                        </p:tgtEl>
+                                        <p:attrNameLst>
+                                          <p:attrName>style.visibility</p:attrName>
+                                        </p:attrNameLst>
+                                      </p:cBhvr>
+                                      <p:to>
+                                        <p:strVal val="visible"/>
+                                      </p:to>
+                                    </p:set>
+                                    <p:animEffect transition="in" filter="fade">
+                                      <p:cBhvr>
+                                        <p:cTn id="15" dur="500"/>
+                                        <p:tgtEl>
+                                          <p:spTgt spid="3">
+                                            <p:txEl>
+                                              <p:pRg st="4" end="4"/>
+                                            </p:txEl>
+                                          </p:spTgt>
+                                        </p:tgtEl>
+                                      </p:cBhvr>
+                                    </p:animEffect>
+                                  </p:childTnLst>
+                                </p:cTn>
+                              </p:par>
+                              <p:par>
+                                <p:cTn id="16" presetID="10" presetClass="entr" presetSubtype="0" fill="hold" nodeType="withEffect">
+                                  <p:stCondLst>
+                                    <p:cond delay="0"/>
+                                  </p:stCondLst>
+                                  <p:childTnLst>
+                                    <p:set>
+                                      <p:cBhvr>
+                                        <p:cTn id="17" dur="1" fill="hold">
+                                          <p:stCondLst>
+                                            <p:cond delay="0"/>
+                                          </p:stCondLst>
+                                        </p:cTn>
+                                        <p:tgtEl>
+                                          <p:spTgt spid="3">
+                                            <p:txEl>
+                                              <p:pRg st="5" end="5"/>
+                                            </p:txEl>
+                                          </p:spTgt>
+                                        </p:tgtEl>
+                                        <p:attrNameLst>
+                                          <p:attrName>style.visibility</p:attrName>
+                                        </p:attrNameLst>
+                                      </p:cBhvr>
+                                      <p:to>
+                                        <p:strVal val="visible"/>
+                                      </p:to>
+                                    </p:set>
+                                    <p:animEffect transition="in" filter="fade">
+                                      <p:cBhvr>
+                                        <p:cTn id="18" dur="500"/>
+                                        <p:tgtEl>
+                                          <p:spTgt spid="3">
+                                            <p:txEl>
+                                              <p:pRg st="5" end="5"/>
+                                            </p:txEl>
+                                          </p:spTgt>
+                                        </p:tgtEl>
+                                      </p:cBhvr>
+                                    </p:animEffect>
+                                  </p:childTnLst>
+                                </p:cTn>
+                              </p:par>
+                              <p:par>
+                                <p:cTn id="19" presetID="10" presetClass="entr" presetSubtype="0" fill="hold" nodeType="withEffect">
+                                  <p:stCondLst>
+                                    <p:cond delay="0"/>
+                                  </p:stCondLst>
+                                  <p:childTnLst>
+                                    <p:set>
+                                      <p:cBhvr>
+                                        <p:cTn id="20" dur="1" fill="hold">
+                                          <p:stCondLst>
+                                            <p:cond delay="0"/>
+                                          </p:stCondLst>
+                                        </p:cTn>
+                                        <p:tgtEl>
+                                          <p:spTgt spid="3">
+                                            <p:txEl>
+                                              <p:pRg st="6" end="6"/>
+                                            </p:txEl>
+                                          </p:spTgt>
+                                        </p:tgtEl>
+                                        <p:attrNameLst>
+                                          <p:attrName>style.visibility</p:attrName>
+                                        </p:attrNameLst>
+                                      </p:cBhvr>
+                                      <p:to>
+                                        <p:strVal val="visible"/>
+                                      </p:to>
+                                    </p:set>
+                                    <p:animEffect transition="in" filter="fade">
+                                      <p:cBhvr>
+                                        <p:cTn id="21" dur="500"/>
+                                        <p:tgtEl>
+                                          <p:spTgt spid="3">
+                                            <p:txEl>
+                                              <p:pRg st="6" end="6"/>
+                                            </p:txEl>
+                                          </p:spTgt>
+                                        </p:tgtEl>
+                                      </p:cBhvr>
+                                    </p:animEffect>
+                                  </p:childTnLst>
+                                </p:cTn>
+                              </p:par>
+                              <p:par>
+                                <p:cTn id="22" presetID="10" presetClass="entr" presetSubtype="0" fill="hold" nodeType="withEffect">
+                                  <p:stCondLst>
+                                    <p:cond delay="0"/>
+                                  </p:stCondLst>
+                                  <p:childTnLst>
+                                    <p:set>
+                                      <p:cBhvr>
+                                        <p:cTn id="23" dur="1" fill="hold">
+                                          <p:stCondLst>
+                                            <p:cond delay="0"/>
+                                          </p:stCondLst>
+                                        </p:cTn>
+                                        <p:tgtEl>
+                                          <p:spTgt spid="3">
+                                            <p:txEl>
+                                              <p:pRg st="7" end="7"/>
+                                            </p:txEl>
+                                          </p:spTgt>
+                                        </p:tgtEl>
+                                        <p:attrNameLst>
+                                          <p:attrName>style.visibility</p:attrName>
+                                        </p:attrNameLst>
+                                      </p:cBhvr>
+                                      <p:to>
+                                        <p:strVal val="visible"/>
+                                      </p:to>
+                                    </p:set>
+                                    <p:animEffect transition="in" filter="fade">
+                                      <p:cBhvr>
+                                        <p:cTn id="24" dur="500"/>
+                                        <p:tgtEl>
+                                          <p:spTgt spid="3">
+                                            <p:txEl>
+                                              <p:pRg st="7" end="7"/>
+                                            </p:txEl>
+                                          </p:spTgt>
+                                        </p:tgtEl>
+                                      </p:cBhvr>
+                                    </p:animEffect>
+                                  </p:childTnLst>
+                                </p:cTn>
+                              </p:par>
+                            </p:childTnLst>
+                          </p:cTn>
+                        </p:par>
+                      </p:childTnLst>
+                    </p:cTn>
+                  </p:par>
+                </p:childTnLst>
+              </p:cTn>
+              <p:prevCondLst>
+                <p:cond evt="onPrev" delay="0">
+                  <p:tgtEl>
+                    <p:sldTgt/>
+                  </p:tgtEl>
+                </p:cond>
+              </p:prevCondLst>
+              <p:nextCondLst>
+                <p:cond evt="onNext" delay="0">
+                  <p:tgtEl>
+                    <p:sldTgt/>
+                  </p:tgtEl>
+                </p:cond>
+              </p:nextCondLst>
+            </p:seq>
+          </p:childTnLst>
+        </p:cTn>
+      </p:par>
+    </p:tnLst>
+  </p:timing>
 </p:sld>
 </file>
 
@@ -4937,7 +6309,7 @@
           <p:cNvPr id="2" name="标题 1">
             <a:extLst>
               <a:ext uri="{FF2B5EF4-FFF2-40B4-BE49-F238E27FC236}">
-                <a16:creationId xmlns:a16="http://schemas.microsoft.com/office/drawing/2014/main" id="{F56C36F9-4535-486E-B0A9-5A9793F7649C}"/>
+                <a16:creationId xmlns:a16="http://schemas.microsoft.com/office/drawing/2014/main" id="{FD80119B-B8D0-4A18-919A-D8A9C364FF2E}"/>
               </a:ext>
             </a:extLst>
           </p:cNvPr>
@@ -4948,15 +6320,24 @@
             <p:ph type="title"/>
           </p:nvPr>
         </p:nvSpPr>
-        <p:spPr/>
-        <p:txBody>
-          <a:bodyPr/>
+        <p:spPr>
+          <a:xfrm>
+            <a:off x="838200" y="365125"/>
+            <a:ext cx="10515600" cy="3869524"/>
+          </a:xfrm>
+        </p:spPr>
+        <p:txBody>
+          <a:bodyPr>
+            <a:normAutofit/>
+          </a:bodyPr>
           <a:lstStyle/>
           <a:p>
-            <a:r>
-              <a:rPr lang="zh-CN" altLang="en-US" dirty="0"/>
-              <a:t>三、智能合约介绍</a:t>
-            </a:r>
+            <a:pPr algn="ctr"/>
+            <a:r>
+              <a:rPr lang="en-US" altLang="zh-CN" sz="7200" dirty="0"/>
+              <a:t>Thank you!</a:t>
+            </a:r>
+            <a:endParaRPr lang="zh-CN" altLang="en-US" sz="7200" dirty="0"/>
           </a:p>
         </p:txBody>
       </p:sp>
@@ -4965,7 +6346,7 @@
           <p:cNvPr id="3" name="内容占位符 2">
             <a:extLst>
               <a:ext uri="{FF2B5EF4-FFF2-40B4-BE49-F238E27FC236}">
-                <a16:creationId xmlns:a16="http://schemas.microsoft.com/office/drawing/2014/main" id="{E3889C37-D9E9-402C-8972-A060ED855CAA}"/>
+                <a16:creationId xmlns:a16="http://schemas.microsoft.com/office/drawing/2014/main" id="{169CC181-209A-4800-9643-95B97CF805C1}"/>
               </a:ext>
             </a:extLst>
           </p:cNvPr>
@@ -4976,11 +6357,87 @@
             <p:ph idx="1"/>
           </p:nvPr>
         </p:nvSpPr>
-        <p:spPr/>
-        <p:txBody>
-          <a:bodyPr/>
+        <p:spPr>
+          <a:xfrm>
+            <a:off x="838200" y="4154749"/>
+            <a:ext cx="10515600" cy="2022213"/>
+          </a:xfrm>
+        </p:spPr>
+        <p:txBody>
+          <a:bodyPr>
+            <a:normAutofit/>
+          </a:bodyPr>
           <a:lstStyle/>
           <a:p>
+            <a:pPr marL="0" indent="0">
+              <a:buNone/>
+            </a:pPr>
+            <a:endParaRPr lang="en-US" altLang="zh-CN" dirty="0"/>
+          </a:p>
+          <a:p>
+            <a:pPr marL="0" indent="0">
+              <a:buNone/>
+            </a:pPr>
+            <a:endParaRPr lang="en-US" altLang="zh-CN" dirty="0"/>
+          </a:p>
+          <a:p>
+            <a:pPr marL="0" indent="0">
+              <a:buNone/>
+            </a:pPr>
+            <a:endParaRPr lang="en-US" altLang="zh-CN" dirty="0"/>
+          </a:p>
+          <a:p>
+            <a:pPr marL="0" indent="0">
+              <a:buNone/>
+            </a:pPr>
+            <a:r>
+              <a:rPr lang="en-US" altLang="zh-CN" dirty="0"/>
+              <a:t>					</a:t>
+            </a:r>
+            <a:r>
+              <a:rPr lang="en-US" altLang="zh-CN" sz="2000" dirty="0"/>
+              <a:t> </a:t>
+            </a:r>
+            <a:r>
+              <a:rPr lang="zh-CN" altLang="en-US" sz="2000" dirty="0"/>
+              <a:t> </a:t>
+            </a:r>
+            <a:r>
+              <a:rPr lang="en-US" altLang="zh-CN" sz="2000" dirty="0" err="1"/>
+              <a:t>Binance</a:t>
+            </a:r>
+            <a:r>
+              <a:rPr lang="zh-CN" altLang="en-US" sz="2000" dirty="0"/>
+              <a:t>    </a:t>
+            </a:r>
+            <a:r>
+              <a:rPr lang="en-US" altLang="zh-CN" sz="2000" dirty="0"/>
+              <a:t>BTC</a:t>
+            </a:r>
+            <a:r>
+              <a:rPr lang="zh-CN" altLang="en-US" sz="2000" dirty="0"/>
+              <a:t>：</a:t>
+            </a:r>
+            <a:r>
+              <a:rPr lang="en-US" altLang="zh-CN" sz="2000" dirty="0"/>
+              <a:t>26,065 RMB	</a:t>
+            </a:r>
+            <a:r>
+              <a:rPr lang="zh-CN" altLang="en-US" sz="2000" dirty="0"/>
+              <a:t> </a:t>
+            </a:r>
+            <a:r>
+              <a:rPr lang="en-US" altLang="zh-CN" sz="2000" dirty="0"/>
+              <a:t>ETH</a:t>
+            </a:r>
+            <a:r>
+              <a:rPr lang="zh-CN" altLang="en-US" sz="2000" dirty="0"/>
+              <a:t>：</a:t>
+            </a:r>
+            <a:r>
+              <a:rPr lang="en-US" altLang="zh-CN" sz="2000" dirty="0"/>
+              <a:t>1,917 RMB</a:t>
+            </a:r>
             <a:endParaRPr lang="zh-CN" altLang="en-US" dirty="0"/>
           </a:p>
         </p:txBody>
@@ -4988,7 +6445,7 @@
     </p:spTree>
     <p:extLst>
       <p:ext uri="{BB962C8B-B14F-4D97-AF65-F5344CB8AC3E}">
-        <p14:creationId xmlns:p14="http://schemas.microsoft.com/office/powerpoint/2010/main" val="3877100491"/>
+        <p14:creationId xmlns:p14="http://schemas.microsoft.com/office/powerpoint/2010/main" val="1326971490"/>
       </p:ext>
     </p:extLst>
   </p:cSld>
@@ -5038,7 +6495,7 @@
           <a:p>
             <a:r>
               <a:rPr lang="zh-CN" altLang="en-US" dirty="0"/>
-              <a:t>一、区块链应用历史及背景</a:t>
+              <a:t>一、区块链历史背景</a:t>
             </a:r>
           </a:p>
         </p:txBody>
@@ -5130,6 +6587,9 @@
               </a:rPr>
               <a:t>论文</a:t>
             </a:r>
+            <a:endParaRPr lang="en-US" altLang="zh-CN" dirty="0"/>
+          </a:p>
+          <a:p>
             <a:endParaRPr lang="en-US" altLang="zh-CN" b="1" dirty="0"/>
           </a:p>
           <a:p>
@@ -5170,84 +6630,6 @@
               <a:t>。</a:t>
             </a:r>
             <a:endParaRPr lang="en-US" altLang="zh-CN" dirty="0"/>
-          </a:p>
-          <a:p>
-            <a:r>
-              <a:rPr lang="zh-CN" altLang="en-US" b="1" dirty="0"/>
-              <a:t>以太坊</a:t>
-            </a:r>
-            <a:r>
-              <a:rPr lang="zh-CN" altLang="en-US" dirty="0"/>
-              <a:t>（英语：</a:t>
-            </a:r>
-            <a:r>
-              <a:rPr lang="en-US" altLang="zh-CN" dirty="0"/>
-              <a:t>Ethereum</a:t>
-            </a:r>
-            <a:r>
-              <a:rPr lang="zh-CN" altLang="en-US" dirty="0"/>
-              <a:t>）是一个</a:t>
-            </a:r>
-            <a:r>
-              <a:rPr lang="zh-CN" altLang="en-US" dirty="0">
-                <a:hlinkClick r:id="rId6" tooltip="开源"/>
-              </a:rPr>
-              <a:t>开源</a:t>
-            </a:r>
-            <a:r>
-              <a:rPr lang="zh-CN" altLang="en-US" dirty="0"/>
-              <a:t>的有</a:t>
-            </a:r>
-            <a:r>
-              <a:rPr lang="zh-CN" altLang="en-US" dirty="0">
-                <a:hlinkClick r:id="rId7"/>
-              </a:rPr>
-              <a:t>智能合约</a:t>
-            </a:r>
-            <a:r>
-              <a:rPr lang="zh-CN" altLang="en-US" dirty="0"/>
-              <a:t>功能的公共</a:t>
-            </a:r>
-            <a:r>
-              <a:rPr lang="zh-CN" altLang="en-US" dirty="0">
-                <a:hlinkClick r:id="rId4" tooltip="区块链"/>
-              </a:rPr>
-              <a:t>区块链</a:t>
-            </a:r>
-            <a:r>
-              <a:rPr lang="zh-CN" altLang="en-US" dirty="0"/>
-              <a:t>平台，提供</a:t>
-            </a:r>
-            <a:r>
-              <a:rPr lang="zh-CN" altLang="en-US" dirty="0">
-                <a:hlinkClick r:id="rId8" tooltip="去中心化"/>
-              </a:rPr>
-              <a:t>去中心化</a:t>
-            </a:r>
-            <a:r>
-              <a:rPr lang="zh-CN" altLang="en-US" dirty="0"/>
-              <a:t>的</a:t>
-            </a:r>
-            <a:r>
-              <a:rPr lang="zh-CN" altLang="en-US" dirty="0">
-                <a:hlinkClick r:id="rId9" tooltip="虚拟机"/>
-              </a:rPr>
-              <a:t>虚拟机</a:t>
-            </a:r>
-            <a:r>
-              <a:rPr lang="zh-CN" altLang="en-US" dirty="0"/>
-              <a:t>来处理</a:t>
-            </a:r>
-            <a:r>
-              <a:rPr lang="zh-CN" altLang="en-US" dirty="0">
-                <a:hlinkClick r:id="rId10" tooltip="点对点"/>
-              </a:rPr>
-              <a:t>点对点</a:t>
-            </a:r>
-            <a:r>
-              <a:rPr lang="zh-CN" altLang="en-US" dirty="0"/>
-              <a:t>合约。</a:t>
-            </a:r>
           </a:p>
           <a:p>
             <a:pPr marL="0" indent="0">
@@ -5270,6 +6652,134 @@
   <p:clrMapOvr>
     <a:masterClrMapping/>
   </p:clrMapOvr>
+  <p:timing>
+    <p:tnLst>
+      <p:par>
+        <p:cTn id="1" dur="indefinite" restart="never" nodeType="tmRoot">
+          <p:childTnLst>
+            <p:seq concurrent="1" nextAc="seek">
+              <p:cTn id="2" dur="indefinite" nodeType="mainSeq">
+                <p:childTnLst>
+                  <p:par>
+                    <p:cTn id="3" fill="hold">
+                      <p:stCondLst>
+                        <p:cond delay="indefinite"/>
+                      </p:stCondLst>
+                      <p:childTnLst>
+                        <p:par>
+                          <p:cTn id="4" fill="hold">
+                            <p:stCondLst>
+                              <p:cond delay="0"/>
+                            </p:stCondLst>
+                            <p:childTnLst>
+                              <p:par>
+                                <p:cTn id="5" presetID="1" presetClass="entr" presetSubtype="0" fill="hold" nodeType="clickEffect">
+                                  <p:stCondLst>
+                                    <p:cond delay="250"/>
+                                  </p:stCondLst>
+                                  <p:childTnLst>
+                                    <p:set>
+                                      <p:cBhvr>
+                                        <p:cTn id="6" dur="1" fill="hold">
+                                          <p:stCondLst>
+                                            <p:cond delay="0"/>
+                                          </p:stCondLst>
+                                        </p:cTn>
+                                        <p:tgtEl>
+                                          <p:spTgt spid="3">
+                                            <p:txEl>
+                                              <p:pRg st="0" end="0"/>
+                                            </p:txEl>
+                                          </p:spTgt>
+                                        </p:tgtEl>
+                                        <p:attrNameLst>
+                                          <p:attrName>style.visibility</p:attrName>
+                                        </p:attrNameLst>
+                                      </p:cBhvr>
+                                      <p:to>
+                                        <p:strVal val="visible"/>
+                                      </p:to>
+                                    </p:set>
+                                  </p:childTnLst>
+                                </p:cTn>
+                              </p:par>
+                            </p:childTnLst>
+                          </p:cTn>
+                        </p:par>
+                      </p:childTnLst>
+                    </p:cTn>
+                  </p:par>
+                  <p:par>
+                    <p:cTn id="7" fill="hold">
+                      <p:stCondLst>
+                        <p:cond delay="indefinite"/>
+                      </p:stCondLst>
+                      <p:childTnLst>
+                        <p:par>
+                          <p:cTn id="8" fill="hold">
+                            <p:stCondLst>
+                              <p:cond delay="0"/>
+                            </p:stCondLst>
+                            <p:childTnLst>
+                              <p:par>
+                                <p:cTn id="9" presetID="1" presetClass="entr" presetSubtype="0" fill="hold" nodeType="clickEffect">
+                                  <p:stCondLst>
+                                    <p:cond delay="0"/>
+                                  </p:stCondLst>
+                                  <p:childTnLst>
+                                    <p:set>
+                                      <p:cBhvr>
+                                        <p:cTn id="10" dur="1" fill="hold">
+                                          <p:stCondLst>
+                                            <p:cond delay="0"/>
+                                          </p:stCondLst>
+                                        </p:cTn>
+                                        <p:tgtEl>
+                                          <p:spTgt spid="3">
+                                            <p:txEl>
+                                              <p:pRg st="2" end="2"/>
+                                            </p:txEl>
+                                          </p:spTgt>
+                                        </p:tgtEl>
+                                        <p:attrNameLst>
+                                          <p:attrName>style.visibility</p:attrName>
+                                        </p:attrNameLst>
+                                      </p:cBhvr>
+                                      <p:to>
+                                        <p:strVal val="visible"/>
+                                      </p:to>
+                                    </p:set>
+                                  </p:childTnLst>
+                                </p:cTn>
+                              </p:par>
+                            </p:childTnLst>
+                          </p:cTn>
+                        </p:par>
+                      </p:childTnLst>
+                    </p:cTn>
+                  </p:par>
+                </p:childTnLst>
+              </p:cTn>
+              <p:prevCondLst>
+                <p:cond evt="onPrev" delay="0">
+                  <p:tgtEl>
+                    <p:sldTgt/>
+                  </p:tgtEl>
+                </p:cond>
+              </p:prevCondLst>
+              <p:nextCondLst>
+                <p:cond evt="onNext" delay="0">
+                  <p:tgtEl>
+                    <p:sldTgt/>
+                  </p:tgtEl>
+                </p:cond>
+              </p:nextCondLst>
+            </p:seq>
+          </p:childTnLst>
+        </p:cTn>
+      </p:par>
+    </p:tnLst>
+  </p:timing>
 </p:sld>
 </file>
 
@@ -5292,10 +6802,10 @@
       </p:grpSpPr>
       <p:sp>
         <p:nvSpPr>
-          <p:cNvPr id="2" name="标题 1">
-            <a:extLst>
-              <a:ext uri="{FF2B5EF4-FFF2-40B4-BE49-F238E27FC236}">
-                <a16:creationId xmlns:a16="http://schemas.microsoft.com/office/drawing/2014/main" id="{0CAE109E-2EE8-45CC-AD59-B5E23921002C}"/>
+          <p:cNvPr id="6" name="标题 1">
+            <a:extLst>
+              <a:ext uri="{FF2B5EF4-FFF2-40B4-BE49-F238E27FC236}">
+                <a16:creationId xmlns:a16="http://schemas.microsoft.com/office/drawing/2014/main" id="{0276884B-F027-4A92-93F7-0BC028ED8A49}"/>
               </a:ext>
             </a:extLst>
           </p:cNvPr>
@@ -5306,92 +6816,35 @@
             <p:ph type="title"/>
           </p:nvPr>
         </p:nvSpPr>
-        <p:spPr/>
+        <p:spPr>
+          <a:xfrm>
+            <a:off x="838200" y="365125"/>
+            <a:ext cx="10515600" cy="1325563"/>
+          </a:xfrm>
+        </p:spPr>
         <p:txBody>
           <a:bodyPr/>
           <a:lstStyle/>
           <a:p>
-            <a:endParaRPr lang="zh-CN" altLang="en-US" dirty="0"/>
-          </a:p>
-        </p:txBody>
-      </p:sp>
-      <p:sp>
-        <p:nvSpPr>
-          <p:cNvPr id="3" name="内容占位符 2">
-            <a:extLst>
-              <a:ext uri="{FF2B5EF4-FFF2-40B4-BE49-F238E27FC236}">
-                <a16:creationId xmlns:a16="http://schemas.microsoft.com/office/drawing/2014/main" id="{86A5D1C4-A8EF-47B6-9111-A347AB0D70D1}"/>
-              </a:ext>
-            </a:extLst>
-          </p:cNvPr>
-          <p:cNvSpPr>
-            <a:spLocks noGrp="1"/>
-          </p:cNvSpPr>
-          <p:nvPr>
-            <p:ph idx="1"/>
-          </p:nvPr>
-        </p:nvSpPr>
-        <p:spPr/>
-        <p:txBody>
-          <a:bodyPr/>
-          <a:lstStyle/>
-          <a:p>
+            <a:r>
+              <a:rPr lang="zh-CN" altLang="en-US" dirty="0"/>
+              <a:t>二、</a:t>
+            </a:r>
             <a:r>
               <a:rPr lang="en-US" altLang="zh-CN" dirty="0"/>
-              <a:t>IBM</a:t>
+              <a:t>Bitcoin</a:t>
             </a:r>
             <a:r>
               <a:rPr lang="zh-CN" altLang="en-US" dirty="0"/>
-              <a:t>的区块链技术</a:t>
-            </a:r>
-            <a:endParaRPr lang="en-US" altLang="zh-CN" dirty="0"/>
-          </a:p>
-          <a:p>
-            <a:r>
-              <a:rPr lang="en-US" altLang="zh-CN" dirty="0"/>
-              <a:t>Linux</a:t>
-            </a:r>
-            <a:r>
-              <a:rPr lang="zh-CN" altLang="en-US" dirty="0"/>
-              <a:t>社区的超级账本</a:t>
-            </a:r>
-            <a:endParaRPr lang="en-US" altLang="zh-CN" dirty="0"/>
-          </a:p>
-          <a:p>
-            <a:r>
-              <a:rPr lang="zh-CN" altLang="en-US" dirty="0"/>
-              <a:t>中国的</a:t>
-            </a:r>
-            <a:r>
-              <a:rPr lang="en-US" altLang="zh-CN" dirty="0"/>
-              <a:t>neo</a:t>
-            </a:r>
-          </a:p>
-          <a:p>
-            <a:r>
-              <a:rPr lang="zh-CN" altLang="en-US" dirty="0"/>
-              <a:t>包括 </a:t>
-            </a:r>
-            <a:r>
-              <a:rPr lang="en-US" altLang="zh-CN" dirty="0"/>
-              <a:t>IPFS</a:t>
-            </a:r>
-            <a:r>
-              <a:rPr lang="zh-CN" altLang="en-US" dirty="0"/>
-              <a:t>的</a:t>
-            </a:r>
-            <a:r>
-              <a:rPr lang="en-US" altLang="zh-CN" dirty="0" err="1"/>
-              <a:t>filecoin</a:t>
-            </a:r>
-            <a:endParaRPr lang="zh-CN" altLang="en-US" dirty="0"/>
+              <a:t>技术原理</a:t>
+            </a:r>
           </a:p>
         </p:txBody>
       </p:sp>
     </p:spTree>
     <p:extLst>
       <p:ext uri="{BB962C8B-B14F-4D97-AF65-F5344CB8AC3E}">
-        <p14:creationId xmlns:p14="http://schemas.microsoft.com/office/powerpoint/2010/main" val="3450342051"/>
+        <p14:creationId xmlns:p14="http://schemas.microsoft.com/office/powerpoint/2010/main" val="3196240650"/>
       </p:ext>
     </p:extLst>
   </p:cSld>
@@ -5423,7 +6876,7 @@
           <p:cNvPr id="2" name="标题 1">
             <a:extLst>
               <a:ext uri="{FF2B5EF4-FFF2-40B4-BE49-F238E27FC236}">
-                <a16:creationId xmlns:a16="http://schemas.microsoft.com/office/drawing/2014/main" id="{6BAC13C6-A9F6-4FC1-8D79-4E4BE6144327}"/>
+                <a16:creationId xmlns:a16="http://schemas.microsoft.com/office/drawing/2014/main" id="{2B1B6404-85C7-44FB-8385-7585A1653D90}"/>
               </a:ext>
             </a:extLst>
           </p:cNvPr>
@@ -5441,15 +6894,7 @@
           <a:p>
             <a:r>
               <a:rPr lang="zh-CN" altLang="en-US" dirty="0"/>
-              <a:t>二、</a:t>
-            </a:r>
-            <a:r>
-              <a:rPr lang="en-US" altLang="zh-CN" dirty="0"/>
-              <a:t>Bitcoin</a:t>
-            </a:r>
-            <a:r>
-              <a:rPr lang="zh-CN" altLang="en-US" dirty="0"/>
-              <a:t>技术原理</a:t>
+              <a:t>传统数字货币</a:t>
             </a:r>
           </a:p>
         </p:txBody>
@@ -5459,7 +6904,7 @@
           <p:cNvPr id="3" name="内容占位符 2">
             <a:extLst>
               <a:ext uri="{FF2B5EF4-FFF2-40B4-BE49-F238E27FC236}">
-                <a16:creationId xmlns:a16="http://schemas.microsoft.com/office/drawing/2014/main" id="{538AB80D-519B-4A9E-BA67-9E445379E913}"/>
+                <a16:creationId xmlns:a16="http://schemas.microsoft.com/office/drawing/2014/main" id="{AB7CA840-2ECE-41A2-80FF-C6DCB0C485A6}"/>
               </a:ext>
             </a:extLst>
           </p:cNvPr>
@@ -5470,25 +6915,225 @@
             <p:ph idx="1"/>
           </p:nvPr>
         </p:nvSpPr>
-        <p:spPr/>
+        <p:spPr>
+          <a:xfrm>
+            <a:off x="6498455" y="3142695"/>
+            <a:ext cx="4784324" cy="3078656"/>
+          </a:xfrm>
+        </p:spPr>
         <p:txBody>
           <a:bodyPr/>
           <a:lstStyle/>
           <a:p>
-            <a:endParaRPr lang="zh-CN" altLang="en-US" dirty="0"/>
-          </a:p>
-        </p:txBody>
-      </p:sp>
+            <a:r>
+              <a:rPr lang="zh-CN" altLang="en-US" dirty="0"/>
+              <a:t>货币滥发</a:t>
+            </a:r>
+            <a:endParaRPr lang="en-US" altLang="zh-CN" dirty="0"/>
+          </a:p>
+          <a:p>
+            <a:r>
+              <a:rPr lang="zh-CN" altLang="en-US" dirty="0"/>
+              <a:t>中心失去信用</a:t>
+            </a:r>
+          </a:p>
+        </p:txBody>
+      </p:sp>
+      <p:pic>
+        <p:nvPicPr>
+          <p:cNvPr id="4" name="图片 3">
+            <a:extLst>
+              <a:ext uri="{FF2B5EF4-FFF2-40B4-BE49-F238E27FC236}">
+                <a16:creationId xmlns:a16="http://schemas.microsoft.com/office/drawing/2014/main" id="{F6D1BDF0-7449-49F2-A68B-84A759566822}"/>
+              </a:ext>
+            </a:extLst>
+          </p:cNvPr>
+          <p:cNvPicPr>
+            <a:picLocks noChangeAspect="1"/>
+          </p:cNvPicPr>
+          <p:nvPr/>
+        </p:nvPicPr>
+        <p:blipFill>
+          <a:blip r:embed="rId2"/>
+          <a:stretch>
+            <a:fillRect/>
+          </a:stretch>
+        </p:blipFill>
+        <p:spPr>
+          <a:xfrm>
+            <a:off x="1751005" y="1825625"/>
+            <a:ext cx="4038095" cy="3095238"/>
+          </a:xfrm>
+          <a:prstGeom prst="rect">
+            <a:avLst/>
+          </a:prstGeom>
+        </p:spPr>
+      </p:pic>
     </p:spTree>
     <p:extLst>
       <p:ext uri="{BB962C8B-B14F-4D97-AF65-F5344CB8AC3E}">
-        <p14:creationId xmlns:p14="http://schemas.microsoft.com/office/powerpoint/2010/main" val="3937834813"/>
+        <p14:creationId xmlns:p14="http://schemas.microsoft.com/office/powerpoint/2010/main" val="1697425748"/>
       </p:ext>
     </p:extLst>
   </p:cSld>
   <p:clrMapOvr>
     <a:masterClrMapping/>
   </p:clrMapOvr>
+  <p:timing>
+    <p:tnLst>
+      <p:par>
+        <p:cTn id="1" dur="indefinite" restart="never" nodeType="tmRoot">
+          <p:childTnLst>
+            <p:seq concurrent="1" nextAc="seek">
+              <p:cTn id="2" dur="indefinite" nodeType="mainSeq">
+                <p:childTnLst>
+                  <p:par>
+                    <p:cTn id="3" fill="hold">
+                      <p:stCondLst>
+                        <p:cond delay="indefinite"/>
+                      </p:stCondLst>
+                      <p:childTnLst>
+                        <p:par>
+                          <p:cTn id="4" fill="hold">
+                            <p:stCondLst>
+                              <p:cond delay="0"/>
+                            </p:stCondLst>
+                            <p:childTnLst>
+                              <p:par>
+                                <p:cTn id="5" presetID="10" presetClass="entr" presetSubtype="0" fill="hold" grpId="0" nodeType="clickEffect">
+                                  <p:stCondLst>
+                                    <p:cond delay="0"/>
+                                  </p:stCondLst>
+                                  <p:childTnLst>
+                                    <p:set>
+                                      <p:cBhvr>
+                                        <p:cTn id="6" dur="1" fill="hold">
+                                          <p:stCondLst>
+                                            <p:cond delay="0"/>
+                                          </p:stCondLst>
+                                        </p:cTn>
+                                        <p:tgtEl>
+                                          <p:spTgt spid="3">
+                                            <p:txEl>
+                                              <p:pRg st="0" end="0"/>
+                                            </p:txEl>
+                                          </p:spTgt>
+                                        </p:tgtEl>
+                                        <p:attrNameLst>
+                                          <p:attrName>style.visibility</p:attrName>
+                                        </p:attrNameLst>
+                                      </p:cBhvr>
+                                      <p:to>
+                                        <p:strVal val="visible"/>
+                                      </p:to>
+                                    </p:set>
+                                    <p:animEffect transition="in" filter="fade">
+                                      <p:cBhvr>
+                                        <p:cTn id="7" dur="500"/>
+                                        <p:tgtEl>
+                                          <p:spTgt spid="3">
+                                            <p:txEl>
+                                              <p:pRg st="0" end="0"/>
+                                            </p:txEl>
+                                          </p:spTgt>
+                                        </p:tgtEl>
+                                      </p:cBhvr>
+                                    </p:animEffect>
+                                  </p:childTnLst>
+                                </p:cTn>
+                              </p:par>
+                            </p:childTnLst>
+                          </p:cTn>
+                        </p:par>
+                      </p:childTnLst>
+                    </p:cTn>
+                  </p:par>
+                  <p:par>
+                    <p:cTn id="8" fill="hold">
+                      <p:stCondLst>
+                        <p:cond delay="indefinite"/>
+                      </p:stCondLst>
+                      <p:childTnLst>
+                        <p:par>
+                          <p:cTn id="9" fill="hold">
+                            <p:stCondLst>
+                              <p:cond delay="0"/>
+                            </p:stCondLst>
+                            <p:childTnLst>
+                              <p:par>
+                                <p:cTn id="10" presetID="10" presetClass="entr" presetSubtype="0" fill="hold" grpId="0" nodeType="clickEffect">
+                                  <p:stCondLst>
+                                    <p:cond delay="0"/>
+                                  </p:stCondLst>
+                                  <p:childTnLst>
+                                    <p:set>
+                                      <p:cBhvr>
+                                        <p:cTn id="11" dur="1" fill="hold">
+                                          <p:stCondLst>
+                                            <p:cond delay="0"/>
+                                          </p:stCondLst>
+                                        </p:cTn>
+                                        <p:tgtEl>
+                                          <p:spTgt spid="3">
+                                            <p:txEl>
+                                              <p:pRg st="1" end="1"/>
+                                            </p:txEl>
+                                          </p:spTgt>
+                                        </p:tgtEl>
+                                        <p:attrNameLst>
+                                          <p:attrName>style.visibility</p:attrName>
+                                        </p:attrNameLst>
+                                      </p:cBhvr>
+                                      <p:to>
+                                        <p:strVal val="visible"/>
+                                      </p:to>
+                                    </p:set>
+                                    <p:animEffect transition="in" filter="fade">
+                                      <p:cBhvr>
+                                        <p:cTn id="12" dur="500"/>
+                                        <p:tgtEl>
+                                          <p:spTgt spid="3">
+                                            <p:txEl>
+                                              <p:pRg st="1" end="1"/>
+                                            </p:txEl>
+                                          </p:spTgt>
+                                        </p:tgtEl>
+                                      </p:cBhvr>
+                                    </p:animEffect>
+                                  </p:childTnLst>
+                                </p:cTn>
+                              </p:par>
+                            </p:childTnLst>
+                          </p:cTn>
+                        </p:par>
+                      </p:childTnLst>
+                    </p:cTn>
+                  </p:par>
+                </p:childTnLst>
+              </p:cTn>
+              <p:prevCondLst>
+                <p:cond evt="onPrev" delay="0">
+                  <p:tgtEl>
+                    <p:sldTgt/>
+                  </p:tgtEl>
+                </p:cond>
+              </p:prevCondLst>
+              <p:nextCondLst>
+                <p:cond evt="onNext" delay="0">
+                  <p:tgtEl>
+                    <p:sldTgt/>
+                  </p:tgtEl>
+                </p:cond>
+              </p:nextCondLst>
+            </p:seq>
+          </p:childTnLst>
+        </p:cTn>
+      </p:par>
+    </p:tnLst>
+    <p:bldLst>
+      <p:bldP spid="3" grpId="0" build="p"/>
+    </p:bldLst>
+  </p:timing>
 </p:sld>
 </file>
 
@@ -5509,12 +7154,37 @@
           <a:chExt cx="0" cy="0"/>
         </a:xfrm>
       </p:grpSpPr>
+      <p:sp>
+        <p:nvSpPr>
+          <p:cNvPr id="3" name="内容占位符 2">
+            <a:extLst>
+              <a:ext uri="{FF2B5EF4-FFF2-40B4-BE49-F238E27FC236}">
+                <a16:creationId xmlns:a16="http://schemas.microsoft.com/office/drawing/2014/main" id="{771115FF-42AE-43DD-A40E-F7A6AD91BA15}"/>
+              </a:ext>
+            </a:extLst>
+          </p:cNvPr>
+          <p:cNvSpPr>
+            <a:spLocks noGrp="1"/>
+          </p:cNvSpPr>
+          <p:nvPr>
+            <p:ph idx="1"/>
+          </p:nvPr>
+        </p:nvSpPr>
+        <p:spPr/>
+        <p:txBody>
+          <a:bodyPr/>
+          <a:lstStyle/>
+          <a:p>
+            <a:endParaRPr lang="zh-CN" altLang="en-US" dirty="0"/>
+          </a:p>
+        </p:txBody>
+      </p:sp>
       <p:pic>
         <p:nvPicPr>
           <p:cNvPr id="4" name="图片 3">
             <a:extLst>
               <a:ext uri="{FF2B5EF4-FFF2-40B4-BE49-F238E27FC236}">
-                <a16:creationId xmlns:a16="http://schemas.microsoft.com/office/drawing/2014/main" id="{DED046A3-CEB6-46D0-8BB5-343251E785F0}"/>
+                <a16:creationId xmlns:a16="http://schemas.microsoft.com/office/drawing/2014/main" id="{E3020896-5A29-46AE-8056-9B49776ACFC2}"/>
               </a:ext>
             </a:extLst>
           </p:cNvPr>
@@ -5531,37 +7201,7 @@
         </p:blipFill>
         <p:spPr>
           <a:xfrm>
-            <a:off x="1200587" y="1375352"/>
-            <a:ext cx="4038095" cy="3095238"/>
-          </a:xfrm>
-          <a:prstGeom prst="rect">
-            <a:avLst/>
-          </a:prstGeom>
-        </p:spPr>
-      </p:pic>
-      <p:pic>
-        <p:nvPicPr>
-          <p:cNvPr id="5" name="图片 4">
-            <a:extLst>
-              <a:ext uri="{FF2B5EF4-FFF2-40B4-BE49-F238E27FC236}">
-                <a16:creationId xmlns:a16="http://schemas.microsoft.com/office/drawing/2014/main" id="{CF38FCA4-542D-43A3-9D76-0955EEEB1454}"/>
-              </a:ext>
-            </a:extLst>
-          </p:cNvPr>
-          <p:cNvPicPr>
-            <a:picLocks noChangeAspect="1"/>
-          </p:cNvPicPr>
-          <p:nvPr/>
-        </p:nvPicPr>
-        <p:blipFill>
-          <a:blip r:embed="rId3"/>
-          <a:stretch>
-            <a:fillRect/>
-          </a:stretch>
-        </p:blipFill>
-        <p:spPr>
-          <a:xfrm>
-            <a:off x="6422977" y="1142018"/>
+            <a:off x="3493345" y="1941035"/>
             <a:ext cx="4885714" cy="3561905"/>
           </a:xfrm>
           <a:prstGeom prst="rect">
@@ -5569,10 +7209,38 @@
           </a:prstGeom>
         </p:spPr>
       </p:pic>
+      <p:sp>
+        <p:nvSpPr>
+          <p:cNvPr id="6" name="标题 5">
+            <a:extLst>
+              <a:ext uri="{FF2B5EF4-FFF2-40B4-BE49-F238E27FC236}">
+                <a16:creationId xmlns:a16="http://schemas.microsoft.com/office/drawing/2014/main" id="{3E51AC09-B1E4-4B28-B18F-00B2325D3385}"/>
+              </a:ext>
+            </a:extLst>
+          </p:cNvPr>
+          <p:cNvSpPr>
+            <a:spLocks noGrp="1"/>
+          </p:cNvSpPr>
+          <p:nvPr>
+            <p:ph type="title"/>
+          </p:nvPr>
+        </p:nvSpPr>
+        <p:spPr/>
+        <p:txBody>
+          <a:bodyPr/>
+          <a:lstStyle/>
+          <a:p>
+            <a:r>
+              <a:rPr lang="zh-CN" altLang="en-US" dirty="0"/>
+              <a:t>比特币</a:t>
+            </a:r>
+          </a:p>
+        </p:txBody>
+      </p:sp>
     </p:spTree>
     <p:extLst>
       <p:ext uri="{BB962C8B-B14F-4D97-AF65-F5344CB8AC3E}">
-        <p14:creationId xmlns:p14="http://schemas.microsoft.com/office/powerpoint/2010/main" val="3196240650"/>
+        <p14:creationId xmlns:p14="http://schemas.microsoft.com/office/powerpoint/2010/main" val="320412195"/>
       </p:ext>
     </p:extLst>
   </p:cSld>
@@ -5599,63 +7267,40 @@
           <a:chExt cx="0" cy="0"/>
         </a:xfrm>
       </p:grpSpPr>
-      <p:sp>
-        <p:nvSpPr>
-          <p:cNvPr id="2" name="标题 1">
-            <a:extLst>
-              <a:ext uri="{FF2B5EF4-FFF2-40B4-BE49-F238E27FC236}">
-                <a16:creationId xmlns:a16="http://schemas.microsoft.com/office/drawing/2014/main" id="{4BC13B5F-C6A1-489B-A086-326FDEDD3881}"/>
-              </a:ext>
-            </a:extLst>
-          </p:cNvPr>
-          <p:cNvSpPr>
-            <a:spLocks noGrp="1"/>
-          </p:cNvSpPr>
-          <p:nvPr>
-            <p:ph type="title"/>
-          </p:nvPr>
-        </p:nvSpPr>
-        <p:spPr/>
-        <p:txBody>
-          <a:bodyPr/>
-          <a:lstStyle/>
-          <a:p>
-            <a:r>
-              <a:rPr lang="zh-CN" altLang="en-US" dirty="0"/>
-              <a:t>电子货币的双花问题</a:t>
-            </a:r>
-          </a:p>
-        </p:txBody>
-      </p:sp>
-      <p:sp>
-        <p:nvSpPr>
-          <p:cNvPr id="3" name="内容占位符 2">
-            <a:extLst>
-              <a:ext uri="{FF2B5EF4-FFF2-40B4-BE49-F238E27FC236}">
-                <a16:creationId xmlns:a16="http://schemas.microsoft.com/office/drawing/2014/main" id="{771115FF-42AE-43DD-A40E-F7A6AD91BA15}"/>
-              </a:ext>
-            </a:extLst>
-          </p:cNvPr>
-          <p:cNvSpPr>
-            <a:spLocks noGrp="1"/>
-          </p:cNvSpPr>
-          <p:nvPr>
-            <p:ph idx="1"/>
-          </p:nvPr>
-        </p:nvSpPr>
-        <p:spPr/>
-        <p:txBody>
-          <a:bodyPr/>
-          <a:lstStyle/>
-          <a:p>
-            <a:endParaRPr lang="zh-CN" altLang="en-US" dirty="0"/>
-          </a:p>
-        </p:txBody>
-      </p:sp>
+      <p:pic>
+        <p:nvPicPr>
+          <p:cNvPr id="4" name="图片 3">
+            <a:extLst>
+              <a:ext uri="{FF2B5EF4-FFF2-40B4-BE49-F238E27FC236}">
+                <a16:creationId xmlns:a16="http://schemas.microsoft.com/office/drawing/2014/main" id="{1CC80573-F118-43BC-AAEA-18999E87828E}"/>
+              </a:ext>
+            </a:extLst>
+          </p:cNvPr>
+          <p:cNvPicPr>
+            <a:picLocks noChangeAspect="1"/>
+          </p:cNvPicPr>
+          <p:nvPr/>
+        </p:nvPicPr>
+        <p:blipFill>
+          <a:blip r:embed="rId2"/>
+          <a:stretch>
+            <a:fillRect/>
+          </a:stretch>
+        </p:blipFill>
+        <p:spPr>
+          <a:xfrm>
+            <a:off x="3331435" y="204186"/>
+            <a:ext cx="3522778" cy="6858000"/>
+          </a:xfrm>
+          <a:prstGeom prst="rect">
+            <a:avLst/>
+          </a:prstGeom>
+        </p:spPr>
+      </p:pic>
     </p:spTree>
     <p:extLst>
       <p:ext uri="{BB962C8B-B14F-4D97-AF65-F5344CB8AC3E}">
-        <p14:creationId xmlns:p14="http://schemas.microsoft.com/office/powerpoint/2010/main" val="320412195"/>
+        <p14:creationId xmlns:p14="http://schemas.microsoft.com/office/powerpoint/2010/main" val="1193095825"/>
       </p:ext>
     </p:extLst>
   </p:cSld>
@@ -5684,10 +7329,168 @@
       </p:grpSpPr>
       <p:sp>
         <p:nvSpPr>
-          <p:cNvPr id="2" name="标题 1">
-            <a:extLst>
-              <a:ext uri="{FF2B5EF4-FFF2-40B4-BE49-F238E27FC236}">
-                <a16:creationId xmlns:a16="http://schemas.microsoft.com/office/drawing/2014/main" id="{363CD36B-D626-452C-8E0D-916A546119D3}"/>
+          <p:cNvPr id="3" name="内容占位符 2">
+            <a:extLst>
+              <a:ext uri="{FF2B5EF4-FFF2-40B4-BE49-F238E27FC236}">
+                <a16:creationId xmlns:a16="http://schemas.microsoft.com/office/drawing/2014/main" id="{59A83941-ADA5-4FAA-B5BB-EBE87358434E}"/>
+              </a:ext>
+            </a:extLst>
+          </p:cNvPr>
+          <p:cNvSpPr>
+            <a:spLocks noGrp="1"/>
+          </p:cNvSpPr>
+          <p:nvPr>
+            <p:ph idx="1"/>
+          </p:nvPr>
+        </p:nvSpPr>
+        <p:spPr>
+          <a:xfrm>
+            <a:off x="1042386" y="2086252"/>
+            <a:ext cx="10515600" cy="3398252"/>
+          </a:xfrm>
+        </p:spPr>
+        <p:txBody>
+          <a:bodyPr>
+            <a:normAutofit fontScale="85000" lnSpcReduction="20000"/>
+          </a:bodyPr>
+          <a:lstStyle/>
+          <a:p>
+            <a:r>
+              <a:rPr lang="zh-CN" altLang="en-US" dirty="0"/>
+              <a:t>私钥：</a:t>
+            </a:r>
+            <a:endParaRPr lang="en-US" altLang="zh-CN" dirty="0"/>
+          </a:p>
+          <a:p>
+            <a:pPr marL="0" indent="0">
+              <a:buNone/>
+            </a:pPr>
+            <a:r>
+              <a:rPr lang="en-US" altLang="zh-CN" dirty="0"/>
+              <a:t>	</a:t>
+            </a:r>
+            <a:r>
+              <a:rPr lang="zh-CN" altLang="en-US" dirty="0"/>
+              <a:t>由系统随机生成一个私钥，范围为</a:t>
+            </a:r>
+            <a:r>
+              <a:rPr lang="en-US" altLang="zh-CN" dirty="0"/>
+              <a:t>1. 0e+77</a:t>
+            </a:r>
+            <a:r>
+              <a:rPr lang="zh-CN" altLang="en-US" dirty="0"/>
+              <a:t>，保证不会</a:t>
+            </a:r>
+            <a:r>
+              <a:rPr lang="en-US" altLang="zh-CN" dirty="0"/>
+              <a:t>	</a:t>
+            </a:r>
+            <a:r>
+              <a:rPr lang="zh-CN" altLang="en-US" dirty="0"/>
+              <a:t>重复</a:t>
+            </a:r>
+            <a:r>
+              <a:rPr lang="en-US" altLang="zh-CN" dirty="0"/>
+              <a:t>	</a:t>
+            </a:r>
+          </a:p>
+          <a:p>
+            <a:pPr marL="0" indent="0">
+              <a:buNone/>
+            </a:pPr>
+            <a:r>
+              <a:rPr lang="en-US" altLang="zh-CN" sz="1100" dirty="0"/>
+              <a:t>		1E99423A4ED27608A15A2616A2B0E9E52CED330AC530EDCC32C8FFC6A526AEDD</a:t>
+            </a:r>
+            <a:endParaRPr lang="en-US" altLang="zh-CN" dirty="0"/>
+          </a:p>
+          <a:p>
+            <a:endParaRPr lang="en-US" altLang="zh-CN" dirty="0"/>
+          </a:p>
+          <a:p>
+            <a:r>
+              <a:rPr lang="zh-CN" altLang="en-US" dirty="0"/>
+              <a:t>公钥：</a:t>
+            </a:r>
+            <a:endParaRPr lang="en-US" altLang="zh-CN" dirty="0"/>
+          </a:p>
+          <a:p>
+            <a:pPr marL="0" indent="0">
+              <a:buNone/>
+            </a:pPr>
+            <a:r>
+              <a:rPr lang="en-US" altLang="zh-CN" dirty="0"/>
+              <a:t>			K </a:t>
+            </a:r>
+            <a:r>
+              <a:rPr lang="zh-CN" altLang="en-US" dirty="0"/>
+              <a:t>（公钥）</a:t>
+            </a:r>
+            <a:r>
+              <a:rPr lang="en-US" altLang="zh-CN" dirty="0"/>
+              <a:t>= k</a:t>
+            </a:r>
+            <a:r>
+              <a:rPr lang="zh-CN" altLang="en-US" dirty="0"/>
+              <a:t>（私钥）</a:t>
+            </a:r>
+            <a:r>
+              <a:rPr lang="en-US" altLang="zh-CN" dirty="0"/>
+              <a:t> * G</a:t>
+            </a:r>
+            <a:r>
+              <a:rPr lang="zh-CN" altLang="en-US" dirty="0"/>
+              <a:t>（加密）</a:t>
+            </a:r>
+            <a:endParaRPr lang="en-US" altLang="zh-CN" dirty="0"/>
+          </a:p>
+          <a:p>
+            <a:pPr marL="0" indent="0">
+              <a:buNone/>
+            </a:pPr>
+            <a:endParaRPr lang="en-US" altLang="zh-CN" dirty="0"/>
+          </a:p>
+          <a:p>
+            <a:r>
+              <a:rPr lang="zh-CN" altLang="en-US" dirty="0"/>
+              <a:t>加密算法：</a:t>
+            </a:r>
+            <a:r>
+              <a:rPr lang="en-US" altLang="zh-CN" dirty="0"/>
+              <a:t>	</a:t>
+            </a:r>
+            <a:r>
+              <a:rPr lang="zh-CN" altLang="en-US" dirty="0"/>
+              <a:t>椭圆曲线加密</a:t>
+            </a:r>
+            <a:r>
+              <a:rPr lang="en-US" altLang="zh-CN" dirty="0"/>
+              <a:t>secp256k1</a:t>
+            </a:r>
+          </a:p>
+          <a:p>
+            <a:pPr marL="914400" lvl="2" indent="0">
+              <a:buNone/>
+            </a:pPr>
+            <a:r>
+              <a:rPr lang="en-US" altLang="zh-CN" dirty="0"/>
+              <a:t>	</a:t>
+            </a:r>
+          </a:p>
+          <a:p>
+            <a:endParaRPr lang="en-US" altLang="zh-CN" dirty="0"/>
+          </a:p>
+          <a:p>
+            <a:endParaRPr lang="zh-CN" altLang="en-US" dirty="0"/>
+          </a:p>
+        </p:txBody>
+      </p:sp>
+      <p:sp>
+        <p:nvSpPr>
+          <p:cNvPr id="4" name="标题 1">
+            <a:extLst>
+              <a:ext uri="{FF2B5EF4-FFF2-40B4-BE49-F238E27FC236}">
+                <a16:creationId xmlns:a16="http://schemas.microsoft.com/office/drawing/2014/main" id="{64C1607D-B5F4-4BBF-A3D2-E234C235768B}"/>
               </a:ext>
             </a:extLst>
           </p:cNvPr>
@@ -5698,66 +7501,411 @@
             <p:ph type="title"/>
           </p:nvPr>
         </p:nvSpPr>
-        <p:spPr/>
+        <p:spPr>
+          <a:xfrm>
+            <a:off x="1042386" y="365125"/>
+            <a:ext cx="10515600" cy="1325563"/>
+          </a:xfrm>
+        </p:spPr>
         <p:txBody>
           <a:bodyPr/>
           <a:lstStyle/>
           <a:p>
             <a:r>
               <a:rPr lang="zh-CN" altLang="en-US" dirty="0"/>
-              <a:t>比特币记账形式</a:t>
-            </a:r>
-            <a:r>
-              <a:rPr lang="en-US" altLang="zh-CN" dirty="0"/>
-              <a:t>,</a:t>
-            </a:r>
-            <a:r>
-              <a:rPr lang="zh-CN" altLang="en-US" dirty="0"/>
-              <a:t>画出各人都有记录的样子，画出</a:t>
-            </a:r>
-            <a:r>
-              <a:rPr lang="en-US" altLang="zh-CN" dirty="0"/>
-              <a:t>chain</a:t>
-            </a:r>
-            <a:endParaRPr lang="zh-CN" altLang="en-US" dirty="0"/>
-          </a:p>
-        </p:txBody>
-      </p:sp>
-      <p:sp>
-        <p:nvSpPr>
-          <p:cNvPr id="3" name="内容占位符 2">
-            <a:extLst>
-              <a:ext uri="{FF2B5EF4-FFF2-40B4-BE49-F238E27FC236}">
-                <a16:creationId xmlns:a16="http://schemas.microsoft.com/office/drawing/2014/main" id="{59A83941-ADA5-4FAA-B5BB-EBE87358434E}"/>
-              </a:ext>
-            </a:extLst>
-          </p:cNvPr>
-          <p:cNvSpPr>
-            <a:spLocks noGrp="1"/>
-          </p:cNvSpPr>
-          <p:nvPr>
-            <p:ph idx="1"/>
-          </p:nvPr>
-        </p:nvSpPr>
-        <p:spPr/>
-        <p:txBody>
-          <a:bodyPr/>
-          <a:lstStyle/>
-          <a:p>
-            <a:endParaRPr lang="zh-CN" altLang="en-US"/>
+              <a:t>生成地址</a:t>
+            </a:r>
           </a:p>
         </p:txBody>
       </p:sp>
     </p:spTree>
     <p:extLst>
       <p:ext uri="{BB962C8B-B14F-4D97-AF65-F5344CB8AC3E}">
-        <p14:creationId xmlns:p14="http://schemas.microsoft.com/office/powerpoint/2010/main" val="772829318"/>
+        <p14:creationId xmlns:p14="http://schemas.microsoft.com/office/powerpoint/2010/main" val="438031169"/>
       </p:ext>
     </p:extLst>
   </p:cSld>
   <p:clrMapOvr>
     <a:masterClrMapping/>
   </p:clrMapOvr>
+  <p:timing>
+    <p:tnLst>
+      <p:par>
+        <p:cTn id="1" dur="indefinite" restart="never" nodeType="tmRoot">
+          <p:childTnLst>
+            <p:seq concurrent="1" nextAc="seek">
+              <p:cTn id="2" dur="indefinite" nodeType="mainSeq">
+                <p:childTnLst>
+                  <p:par>
+                    <p:cTn id="3" fill="hold">
+                      <p:stCondLst>
+                        <p:cond delay="indefinite"/>
+                      </p:stCondLst>
+                      <p:childTnLst>
+                        <p:par>
+                          <p:cTn id="4" fill="hold">
+                            <p:stCondLst>
+                              <p:cond delay="0"/>
+                            </p:stCondLst>
+                            <p:childTnLst>
+                              <p:par>
+                                <p:cTn id="5" presetID="10" presetClass="entr" presetSubtype="0" fill="hold" nodeType="clickEffect">
+                                  <p:stCondLst>
+                                    <p:cond delay="0"/>
+                                  </p:stCondLst>
+                                  <p:childTnLst>
+                                    <p:set>
+                                      <p:cBhvr>
+                                        <p:cTn id="6" dur="1" fill="hold">
+                                          <p:stCondLst>
+                                            <p:cond delay="0"/>
+                                          </p:stCondLst>
+                                        </p:cTn>
+                                        <p:tgtEl>
+                                          <p:spTgt spid="3">
+                                            <p:txEl>
+                                              <p:pRg st="0" end="0"/>
+                                            </p:txEl>
+                                          </p:spTgt>
+                                        </p:tgtEl>
+                                        <p:attrNameLst>
+                                          <p:attrName>style.visibility</p:attrName>
+                                        </p:attrNameLst>
+                                      </p:cBhvr>
+                                      <p:to>
+                                        <p:strVal val="visible"/>
+                                      </p:to>
+                                    </p:set>
+                                    <p:animEffect transition="in" filter="fade">
+                                      <p:cBhvr>
+                                        <p:cTn id="7" dur="500"/>
+                                        <p:tgtEl>
+                                          <p:spTgt spid="3">
+                                            <p:txEl>
+                                              <p:pRg st="0" end="0"/>
+                                            </p:txEl>
+                                          </p:spTgt>
+                                        </p:tgtEl>
+                                      </p:cBhvr>
+                                    </p:animEffect>
+                                  </p:childTnLst>
+                                </p:cTn>
+                              </p:par>
+                            </p:childTnLst>
+                          </p:cTn>
+                        </p:par>
+                      </p:childTnLst>
+                    </p:cTn>
+                  </p:par>
+                  <p:par>
+                    <p:cTn id="8" fill="hold">
+                      <p:stCondLst>
+                        <p:cond delay="indefinite"/>
+                      </p:stCondLst>
+                      <p:childTnLst>
+                        <p:par>
+                          <p:cTn id="9" fill="hold">
+                            <p:stCondLst>
+                              <p:cond delay="0"/>
+                            </p:stCondLst>
+                            <p:childTnLst>
+                              <p:par>
+                                <p:cTn id="10" presetID="10" presetClass="entr" presetSubtype="0" fill="hold" nodeType="clickEffect">
+                                  <p:stCondLst>
+                                    <p:cond delay="0"/>
+                                  </p:stCondLst>
+                                  <p:childTnLst>
+                                    <p:set>
+                                      <p:cBhvr>
+                                        <p:cTn id="11" dur="1" fill="hold">
+                                          <p:stCondLst>
+                                            <p:cond delay="0"/>
+                                          </p:stCondLst>
+                                        </p:cTn>
+                                        <p:tgtEl>
+                                          <p:spTgt spid="3">
+                                            <p:txEl>
+                                              <p:pRg st="1" end="1"/>
+                                            </p:txEl>
+                                          </p:spTgt>
+                                        </p:tgtEl>
+                                        <p:attrNameLst>
+                                          <p:attrName>style.visibility</p:attrName>
+                                        </p:attrNameLst>
+                                      </p:cBhvr>
+                                      <p:to>
+                                        <p:strVal val="visible"/>
+                                      </p:to>
+                                    </p:set>
+                                    <p:animEffect transition="in" filter="fade">
+                                      <p:cBhvr>
+                                        <p:cTn id="12" dur="500"/>
+                                        <p:tgtEl>
+                                          <p:spTgt spid="3">
+                                            <p:txEl>
+                                              <p:pRg st="1" end="1"/>
+                                            </p:txEl>
+                                          </p:spTgt>
+                                        </p:tgtEl>
+                                      </p:cBhvr>
+                                    </p:animEffect>
+                                  </p:childTnLst>
+                                </p:cTn>
+                              </p:par>
+                            </p:childTnLst>
+                          </p:cTn>
+                        </p:par>
+                      </p:childTnLst>
+                    </p:cTn>
+                  </p:par>
+                  <p:par>
+                    <p:cTn id="13" fill="hold">
+                      <p:stCondLst>
+                        <p:cond delay="indefinite"/>
+                      </p:stCondLst>
+                      <p:childTnLst>
+                        <p:par>
+                          <p:cTn id="14" fill="hold">
+                            <p:stCondLst>
+                              <p:cond delay="0"/>
+                            </p:stCondLst>
+                            <p:childTnLst>
+                              <p:par>
+                                <p:cTn id="15" presetID="10" presetClass="entr" presetSubtype="0" fill="hold" nodeType="clickEffect">
+                                  <p:stCondLst>
+                                    <p:cond delay="0"/>
+                                  </p:stCondLst>
+                                  <p:childTnLst>
+                                    <p:set>
+                                      <p:cBhvr>
+                                        <p:cTn id="16" dur="1" fill="hold">
+                                          <p:stCondLst>
+                                            <p:cond delay="0"/>
+                                          </p:stCondLst>
+                                        </p:cTn>
+                                        <p:tgtEl>
+                                          <p:spTgt spid="3">
+                                            <p:txEl>
+                                              <p:pRg st="2" end="2"/>
+                                            </p:txEl>
+                                          </p:spTgt>
+                                        </p:tgtEl>
+                                        <p:attrNameLst>
+                                          <p:attrName>style.visibility</p:attrName>
+                                        </p:attrNameLst>
+                                      </p:cBhvr>
+                                      <p:to>
+                                        <p:strVal val="visible"/>
+                                      </p:to>
+                                    </p:set>
+                                    <p:animEffect transition="in" filter="fade">
+                                      <p:cBhvr>
+                                        <p:cTn id="17" dur="500"/>
+                                        <p:tgtEl>
+                                          <p:spTgt spid="3">
+                                            <p:txEl>
+                                              <p:pRg st="2" end="2"/>
+                                            </p:txEl>
+                                          </p:spTgt>
+                                        </p:tgtEl>
+                                      </p:cBhvr>
+                                    </p:animEffect>
+                                  </p:childTnLst>
+                                </p:cTn>
+                              </p:par>
+                            </p:childTnLst>
+                          </p:cTn>
+                        </p:par>
+                      </p:childTnLst>
+                    </p:cTn>
+                  </p:par>
+                  <p:par>
+                    <p:cTn id="18" fill="hold">
+                      <p:stCondLst>
+                        <p:cond delay="indefinite"/>
+                      </p:stCondLst>
+                      <p:childTnLst>
+                        <p:par>
+                          <p:cTn id="19" fill="hold">
+                            <p:stCondLst>
+                              <p:cond delay="0"/>
+                            </p:stCondLst>
+                            <p:childTnLst>
+                              <p:par>
+                                <p:cTn id="20" presetID="10" presetClass="entr" presetSubtype="0" fill="hold" nodeType="clickEffect">
+                                  <p:stCondLst>
+                                    <p:cond delay="0"/>
+                                  </p:stCondLst>
+                                  <p:childTnLst>
+                                    <p:set>
+                                      <p:cBhvr>
+                                        <p:cTn id="21" dur="1" fill="hold">
+                                          <p:stCondLst>
+                                            <p:cond delay="0"/>
+                                          </p:stCondLst>
+                                        </p:cTn>
+                                        <p:tgtEl>
+                                          <p:spTgt spid="3">
+                                            <p:txEl>
+                                              <p:pRg st="4" end="4"/>
+                                            </p:txEl>
+                                          </p:spTgt>
+                                        </p:tgtEl>
+                                        <p:attrNameLst>
+                                          <p:attrName>style.visibility</p:attrName>
+                                        </p:attrNameLst>
+                                      </p:cBhvr>
+                                      <p:to>
+                                        <p:strVal val="visible"/>
+                                      </p:to>
+                                    </p:set>
+                                    <p:animEffect transition="in" filter="fade">
+                                      <p:cBhvr>
+                                        <p:cTn id="22" dur="500"/>
+                                        <p:tgtEl>
+                                          <p:spTgt spid="3">
+                                            <p:txEl>
+                                              <p:pRg st="4" end="4"/>
+                                            </p:txEl>
+                                          </p:spTgt>
+                                        </p:tgtEl>
+                                      </p:cBhvr>
+                                    </p:animEffect>
+                                  </p:childTnLst>
+                                </p:cTn>
+                              </p:par>
+                              <p:par>
+                                <p:cTn id="23" presetID="10" presetClass="entr" presetSubtype="0" fill="hold" nodeType="withEffect">
+                                  <p:stCondLst>
+                                    <p:cond delay="0"/>
+                                  </p:stCondLst>
+                                  <p:childTnLst>
+                                    <p:set>
+                                      <p:cBhvr>
+                                        <p:cTn id="24" dur="1" fill="hold">
+                                          <p:stCondLst>
+                                            <p:cond delay="0"/>
+                                          </p:stCondLst>
+                                        </p:cTn>
+                                        <p:tgtEl>
+                                          <p:spTgt spid="3">
+                                            <p:txEl>
+                                              <p:pRg st="5" end="5"/>
+                                            </p:txEl>
+                                          </p:spTgt>
+                                        </p:tgtEl>
+                                        <p:attrNameLst>
+                                          <p:attrName>style.visibility</p:attrName>
+                                        </p:attrNameLst>
+                                      </p:cBhvr>
+                                      <p:to>
+                                        <p:strVal val="visible"/>
+                                      </p:to>
+                                    </p:set>
+                                    <p:animEffect transition="in" filter="fade">
+                                      <p:cBhvr>
+                                        <p:cTn id="25" dur="500"/>
+                                        <p:tgtEl>
+                                          <p:spTgt spid="3">
+                                            <p:txEl>
+                                              <p:pRg st="5" end="5"/>
+                                            </p:txEl>
+                                          </p:spTgt>
+                                        </p:tgtEl>
+                                      </p:cBhvr>
+                                    </p:animEffect>
+                                  </p:childTnLst>
+                                </p:cTn>
+                              </p:par>
+                            </p:childTnLst>
+                          </p:cTn>
+                        </p:par>
+                      </p:childTnLst>
+                    </p:cTn>
+                  </p:par>
+                  <p:par>
+                    <p:cTn id="26" fill="hold">
+                      <p:stCondLst>
+                        <p:cond delay="indefinite"/>
+                      </p:stCondLst>
+                      <p:childTnLst>
+                        <p:par>
+                          <p:cTn id="27" fill="hold">
+                            <p:stCondLst>
+                              <p:cond delay="0"/>
+                            </p:stCondLst>
+                            <p:childTnLst>
+                              <p:par>
+                                <p:cTn id="28" presetID="10" presetClass="entr" presetSubtype="0" fill="hold" nodeType="clickEffect">
+                                  <p:stCondLst>
+                                    <p:cond delay="0"/>
+                                  </p:stCondLst>
+                                  <p:childTnLst>
+                                    <p:set>
+                                      <p:cBhvr>
+                                        <p:cTn id="29" dur="1" fill="hold">
+                                          <p:stCondLst>
+                                            <p:cond delay="0"/>
+                                          </p:stCondLst>
+                                        </p:cTn>
+                                        <p:tgtEl>
+                                          <p:spTgt spid="3">
+                                            <p:txEl>
+                                              <p:pRg st="7" end="7"/>
+                                            </p:txEl>
+                                          </p:spTgt>
+                                        </p:tgtEl>
+                                        <p:attrNameLst>
+                                          <p:attrName>style.visibility</p:attrName>
+                                        </p:attrNameLst>
+                                      </p:cBhvr>
+                                      <p:to>
+                                        <p:strVal val="visible"/>
+                                      </p:to>
+                                    </p:set>
+                                    <p:animEffect transition="in" filter="fade">
+                                      <p:cBhvr>
+                                        <p:cTn id="30" dur="500"/>
+                                        <p:tgtEl>
+                                          <p:spTgt spid="3">
+                                            <p:txEl>
+                                              <p:pRg st="7" end="7"/>
+                                            </p:txEl>
+                                          </p:spTgt>
+                                        </p:tgtEl>
+                                      </p:cBhvr>
+                                    </p:animEffect>
+                                  </p:childTnLst>
+                                </p:cTn>
+                              </p:par>
+                            </p:childTnLst>
+                          </p:cTn>
+                        </p:par>
+                      </p:childTnLst>
+                    </p:cTn>
+                  </p:par>
+                </p:childTnLst>
+              </p:cTn>
+              <p:prevCondLst>
+                <p:cond evt="onPrev" delay="0">
+                  <p:tgtEl>
+                    <p:sldTgt/>
+                  </p:tgtEl>
+                </p:cond>
+              </p:prevCondLst>
+              <p:nextCondLst>
+                <p:cond evt="onNext" delay="0">
+                  <p:tgtEl>
+                    <p:sldTgt/>
+                  </p:tgtEl>
+                </p:cond>
+              </p:nextCondLst>
+            </p:seq>
+          </p:childTnLst>
+        </p:cTn>
+      </p:par>
+    </p:tnLst>
+  </p:timing>
 </p:sld>
 </file>
 
@@ -5778,65 +7926,12 @@
           <a:chExt cx="0" cy="0"/>
         </a:xfrm>
       </p:grpSpPr>
-      <p:sp>
-        <p:nvSpPr>
-          <p:cNvPr id="2" name="标题 1">
-            <a:extLst>
-              <a:ext uri="{FF2B5EF4-FFF2-40B4-BE49-F238E27FC236}">
-                <a16:creationId xmlns:a16="http://schemas.microsoft.com/office/drawing/2014/main" id="{7C74F547-3BF7-4A8C-8453-DECF3AB1F863}"/>
-              </a:ext>
-            </a:extLst>
-          </p:cNvPr>
-          <p:cNvSpPr>
-            <a:spLocks noGrp="1"/>
-          </p:cNvSpPr>
-          <p:nvPr>
-            <p:ph type="title"/>
-          </p:nvPr>
-        </p:nvSpPr>
-        <p:spPr/>
-        <p:txBody>
-          <a:bodyPr/>
-          <a:lstStyle/>
-          <a:p>
-            <a:r>
-              <a:rPr lang="zh-CN" altLang="en-US" dirty="0"/>
-              <a:t>说明一下比特币交易是由地址到地址</a:t>
-            </a:r>
-          </a:p>
-        </p:txBody>
-      </p:sp>
-      <p:sp>
-        <p:nvSpPr>
-          <p:cNvPr id="3" name="内容占位符 2">
-            <a:extLst>
-              <a:ext uri="{FF2B5EF4-FFF2-40B4-BE49-F238E27FC236}">
-                <a16:creationId xmlns:a16="http://schemas.microsoft.com/office/drawing/2014/main" id="{BFD8BCEE-E2E4-43D4-A541-2A3FCDAB6963}"/>
-              </a:ext>
-            </a:extLst>
-          </p:cNvPr>
-          <p:cNvSpPr>
-            <a:spLocks noGrp="1"/>
-          </p:cNvSpPr>
-          <p:nvPr>
-            <p:ph idx="1"/>
-          </p:nvPr>
-        </p:nvSpPr>
-        <p:spPr/>
-        <p:txBody>
-          <a:bodyPr/>
-          <a:lstStyle/>
-          <a:p>
-            <a:endParaRPr lang="zh-CN" altLang="en-US" dirty="0"/>
-          </a:p>
-        </p:txBody>
-      </p:sp>
       <p:pic>
         <p:nvPicPr>
           <p:cNvPr id="4" name="图片 3">
             <a:extLst>
               <a:ext uri="{FF2B5EF4-FFF2-40B4-BE49-F238E27FC236}">
-                <a16:creationId xmlns:a16="http://schemas.microsoft.com/office/drawing/2014/main" id="{1CC80573-F118-43BC-AAEA-18999E87828E}"/>
+                <a16:creationId xmlns:a16="http://schemas.microsoft.com/office/drawing/2014/main" id="{FF7101A6-9396-4361-B9D6-8979583AAF10}"/>
               </a:ext>
             </a:extLst>
           </p:cNvPr>
@@ -5853,8 +7948,8 @@
         </p:blipFill>
         <p:spPr>
           <a:xfrm>
-            <a:off x="3411333" y="0"/>
-            <a:ext cx="3522778" cy="6858000"/>
+            <a:off x="2282291" y="0"/>
+            <a:ext cx="6491075" cy="6858000"/>
           </a:xfrm>
           <a:prstGeom prst="rect">
             <a:avLst/>
@@ -5864,7 +7959,7 @@
     </p:spTree>
     <p:extLst>
       <p:ext uri="{BB962C8B-B14F-4D97-AF65-F5344CB8AC3E}">
-        <p14:creationId xmlns:p14="http://schemas.microsoft.com/office/powerpoint/2010/main" val="1193095825"/>
+        <p14:creationId xmlns:p14="http://schemas.microsoft.com/office/powerpoint/2010/main" val="3352238733"/>
       </p:ext>
     </p:extLst>
   </p:cSld>
@@ -6167,4 +8262,47 @@
     </a:ext>
   </a:extLst>
 </a:theme>
+</file>
+
+<file path=ppt/theme/themeOverride1.xml><?xml version="1.0" encoding="utf-8"?>
+<a:themeOverride xmlns:a="http://schemas.openxmlformats.org/drawingml/2006/main">
+  <a:clrScheme name="Office">
+    <a:dk1>
+      <a:sysClr val="windowText" lastClr="000000"/>
+    </a:dk1>
+    <a:lt1>
+      <a:sysClr val="window" lastClr="FFFFFF"/>
+    </a:lt1>
+    <a:dk2>
+      <a:srgbClr val="44546A"/>
+    </a:dk2>
+    <a:lt2>
+      <a:srgbClr val="E7E6E6"/>
+    </a:lt2>
+    <a:accent1>
+      <a:srgbClr val="4472C4"/>
+    </a:accent1>
+    <a:accent2>
+      <a:srgbClr val="ED7D31"/>
+    </a:accent2>
+    <a:accent3>
+      <a:srgbClr val="A5A5A5"/>
+    </a:accent3>
+    <a:accent4>
+      <a:srgbClr val="FFC000"/>
+    </a:accent4>
+    <a:accent5>
+      <a:srgbClr val="5B9BD5"/>
+    </a:accent5>
+    <a:accent6>
+      <a:srgbClr val="70AD47"/>
+    </a:accent6>
+    <a:hlink>
+      <a:srgbClr val="0563C1"/>
+    </a:hlink>
+    <a:folHlink>
+      <a:srgbClr val="954F72"/>
+    </a:folHlink>
+  </a:clrScheme>
+</a:themeOverride>
 </file>
</xml_diff>